<commit_message>
Adding latest version of the slides - 13 NOV 23
</commit_message>
<xml_diff>
--- a/MACD_Indicators_Group_2.pptx
+++ b/MACD_Indicators_Group_2.pptx
@@ -5,7 +5,7 @@
     <p:sldMasterId id="2147483648" r:id="rId1"/>
   </p:sldMasterIdLst>
   <p:notesMasterIdLst>
-    <p:notesMasterId r:id="rId23"/>
+    <p:notesMasterId r:id="rId24"/>
   </p:notesMasterIdLst>
   <p:sldIdLst>
     <p:sldId id="256" r:id="rId2"/>
@@ -24,11 +24,12 @@
     <p:sldId id="270" r:id="rId15"/>
     <p:sldId id="262" r:id="rId16"/>
     <p:sldId id="274" r:id="rId17"/>
-    <p:sldId id="273" r:id="rId18"/>
-    <p:sldId id="266" r:id="rId19"/>
-    <p:sldId id="263" r:id="rId20"/>
-    <p:sldId id="264" r:id="rId21"/>
-    <p:sldId id="265" r:id="rId22"/>
+    <p:sldId id="280" r:id="rId18"/>
+    <p:sldId id="273" r:id="rId19"/>
+    <p:sldId id="266" r:id="rId20"/>
+    <p:sldId id="263" r:id="rId21"/>
+    <p:sldId id="264" r:id="rId22"/>
+    <p:sldId id="265" r:id="rId23"/>
   </p:sldIdLst>
   <p:sldSz cx="12192000" cy="6858000"/>
   <p:notesSz cx="6858000" cy="9144000"/>
@@ -217,7 +218,7 @@
           <a:p>
             <a:fld id="{439B18EF-0913-4D1F-A602-DE1ED3B7DBAF}" type="datetimeFigureOut">
               <a:rPr lang="en-US" smtClean="0"/>
-              <a:t>11/12/2023</a:t>
+              <a:t>11/13/2023</a:t>
             </a:fld>
             <a:endParaRPr lang="en-US"/>
           </a:p>
@@ -905,7 +906,7 @@
           <a:p>
             <a:fld id="{C5FB7A86-EF25-4381-A128-19BA6E5932CE}" type="datetimeFigureOut">
               <a:rPr lang="en-US" smtClean="0"/>
-              <a:t>11/12/2023</a:t>
+              <a:t>11/13/2023</a:t>
             </a:fld>
             <a:endParaRPr lang="en-US"/>
           </a:p>
@@ -1103,7 +1104,7 @@
           <a:p>
             <a:fld id="{C5FB7A86-EF25-4381-A128-19BA6E5932CE}" type="datetimeFigureOut">
               <a:rPr lang="en-US" smtClean="0"/>
-              <a:t>11/12/2023</a:t>
+              <a:t>11/13/2023</a:t>
             </a:fld>
             <a:endParaRPr lang="en-US"/>
           </a:p>
@@ -1311,7 +1312,7 @@
           <a:p>
             <a:fld id="{C5FB7A86-EF25-4381-A128-19BA6E5932CE}" type="datetimeFigureOut">
               <a:rPr lang="en-US" smtClean="0"/>
-              <a:t>11/12/2023</a:t>
+              <a:t>11/13/2023</a:t>
             </a:fld>
             <a:endParaRPr lang="en-US"/>
           </a:p>
@@ -1509,7 +1510,7 @@
           <a:p>
             <a:fld id="{C5FB7A86-EF25-4381-A128-19BA6E5932CE}" type="datetimeFigureOut">
               <a:rPr lang="en-US" smtClean="0"/>
-              <a:t>11/12/2023</a:t>
+              <a:t>11/13/2023</a:t>
             </a:fld>
             <a:endParaRPr lang="en-US"/>
           </a:p>
@@ -1784,7 +1785,7 @@
           <a:p>
             <a:fld id="{C5FB7A86-EF25-4381-A128-19BA6E5932CE}" type="datetimeFigureOut">
               <a:rPr lang="en-US" smtClean="0"/>
-              <a:t>11/12/2023</a:t>
+              <a:t>11/13/2023</a:t>
             </a:fld>
             <a:endParaRPr lang="en-US"/>
           </a:p>
@@ -2049,7 +2050,7 @@
           <a:p>
             <a:fld id="{C5FB7A86-EF25-4381-A128-19BA6E5932CE}" type="datetimeFigureOut">
               <a:rPr lang="en-US" smtClean="0"/>
-              <a:t>11/12/2023</a:t>
+              <a:t>11/13/2023</a:t>
             </a:fld>
             <a:endParaRPr lang="en-US"/>
           </a:p>
@@ -2461,7 +2462,7 @@
           <a:p>
             <a:fld id="{C5FB7A86-EF25-4381-A128-19BA6E5932CE}" type="datetimeFigureOut">
               <a:rPr lang="en-US" smtClean="0"/>
-              <a:t>11/12/2023</a:t>
+              <a:t>11/13/2023</a:t>
             </a:fld>
             <a:endParaRPr lang="en-US"/>
           </a:p>
@@ -2602,7 +2603,7 @@
           <a:p>
             <a:fld id="{C5FB7A86-EF25-4381-A128-19BA6E5932CE}" type="datetimeFigureOut">
               <a:rPr lang="en-US" smtClean="0"/>
-              <a:t>11/12/2023</a:t>
+              <a:t>11/13/2023</a:t>
             </a:fld>
             <a:endParaRPr lang="en-US"/>
           </a:p>
@@ -2715,7 +2716,7 @@
           <a:p>
             <a:fld id="{C5FB7A86-EF25-4381-A128-19BA6E5932CE}" type="datetimeFigureOut">
               <a:rPr lang="en-US" smtClean="0"/>
-              <a:t>11/12/2023</a:t>
+              <a:t>11/13/2023</a:t>
             </a:fld>
             <a:endParaRPr lang="en-US"/>
           </a:p>
@@ -3026,7 +3027,7 @@
           <a:p>
             <a:fld id="{C5FB7A86-EF25-4381-A128-19BA6E5932CE}" type="datetimeFigureOut">
               <a:rPr lang="en-US" smtClean="0"/>
-              <a:t>11/12/2023</a:t>
+              <a:t>11/13/2023</a:t>
             </a:fld>
             <a:endParaRPr lang="en-US"/>
           </a:p>
@@ -3314,7 +3315,7 @@
           <a:p>
             <a:fld id="{C5FB7A86-EF25-4381-A128-19BA6E5932CE}" type="datetimeFigureOut">
               <a:rPr lang="en-US" smtClean="0"/>
-              <a:t>11/12/2023</a:t>
+              <a:t>11/13/2023</a:t>
             </a:fld>
             <a:endParaRPr lang="en-US"/>
           </a:p>
@@ -3555,7 +3556,7 @@
           <a:p>
             <a:fld id="{C5FB7A86-EF25-4381-A128-19BA6E5932CE}" type="datetimeFigureOut">
               <a:rPr lang="en-US" smtClean="0"/>
-              <a:t>11/12/2023</a:t>
+              <a:t>11/13/2023</a:t>
             </a:fld>
             <a:endParaRPr lang="en-US"/>
           </a:p>
@@ -4197,7 +4198,7 @@
               <a:t>MACD Indicator as a Trading Strategy</a:t>
             </a:r>
             <a:br>
-              <a:rPr lang="en-US" sz="3700" b="1" dirty="0">
+              <a:rPr lang="en-US" sz="3700" b="1">
                 <a:solidFill>
                   <a:schemeClr val="bg1"/>
                 </a:solidFill>
@@ -4207,7 +4208,7 @@
               </a:rPr>
             </a:br>
             <a:r>
-              <a:rPr lang="en-US" sz="1400" b="1" i="1" dirty="0">
+              <a:rPr lang="en-US" sz="1400" b="1" i="1">
                 <a:solidFill>
                   <a:schemeClr val="bg1">
                     <a:lumMod val="75000"/>
@@ -4217,7 +4218,20 @@
                 <a:ea typeface="Cambria" panose="02040503050406030204" pitchFamily="18" charset="0"/>
                 <a:cs typeface="Arial" panose="020B0604020202020204" pitchFamily="34" charset="0"/>
               </a:rPr>
-              <a:t>14 November 2023</a:t>
+              <a:t>13 </a:t>
+            </a:r>
+            <a:r>
+              <a:rPr lang="en-US" sz="1400" b="1" i="1" dirty="0">
+                <a:solidFill>
+                  <a:schemeClr val="bg1">
+                    <a:lumMod val="75000"/>
+                  </a:schemeClr>
+                </a:solidFill>
+                <a:latin typeface="Arial" panose="020B0604020202020204" pitchFamily="34" charset="0"/>
+                <a:ea typeface="Cambria" panose="02040503050406030204" pitchFamily="18" charset="0"/>
+                <a:cs typeface="Arial" panose="020B0604020202020204" pitchFamily="34" charset="0"/>
+              </a:rPr>
+              <a:t>November 2023</a:t>
             </a:r>
             <a:endParaRPr lang="en-US" sz="3700" b="1" i="1" dirty="0">
               <a:solidFill>
@@ -7820,10 +7834,10 @@
       </p:sp>
       <p:pic>
         <p:nvPicPr>
-          <p:cNvPr id="15" name="Picture 14">
-            <a:extLst>
-              <a:ext uri="{FF2B5EF4-FFF2-40B4-BE49-F238E27FC236}">
-                <a16:creationId xmlns:a16="http://schemas.microsoft.com/office/drawing/2014/main" id="{56D44CFA-DF69-9C42-AFDE-C1AA560CF521}"/>
+          <p:cNvPr id="10" name="Picture 9">
+            <a:extLst>
+              <a:ext uri="{FF2B5EF4-FFF2-40B4-BE49-F238E27FC236}">
+                <a16:creationId xmlns:a16="http://schemas.microsoft.com/office/drawing/2014/main" id="{DDD7F135-0BFD-EADE-6AF2-C3DE6D5EA351}"/>
               </a:ext>
             </a:extLst>
           </p:cNvPr>
@@ -7840,8 +7854,8 @@
         </p:blipFill>
         <p:spPr>
           <a:xfrm>
-            <a:off x="897731" y="1857374"/>
-            <a:ext cx="10515600" cy="4662657"/>
+            <a:off x="2514601" y="1927226"/>
+            <a:ext cx="6815722" cy="4623848"/>
           </a:xfrm>
           <a:prstGeom prst="rect">
             <a:avLst/>
@@ -8125,147 +8139,6 @@
       </p:sp>
       <p:sp>
         <p:nvSpPr>
-          <p:cNvPr id="7" name="TextBox 6">
-            <a:extLst>
-              <a:ext uri="{FF2B5EF4-FFF2-40B4-BE49-F238E27FC236}">
-                <a16:creationId xmlns:a16="http://schemas.microsoft.com/office/drawing/2014/main" id="{24C484EF-37A4-616D-7805-4B1637442430}"/>
-              </a:ext>
-            </a:extLst>
-          </p:cNvPr>
-          <p:cNvSpPr txBox="1"/>
-          <p:nvPr/>
-        </p:nvSpPr>
-        <p:spPr>
-          <a:xfrm>
-            <a:off x="-3525441" y="3306927"/>
-            <a:ext cx="3406379" cy="1477328"/>
-          </a:xfrm>
-          <a:prstGeom prst="rect">
-            <a:avLst/>
-          </a:prstGeom>
-          <a:noFill/>
-        </p:spPr>
-        <p:txBody>
-          <a:bodyPr wrap="square">
-            <a:spAutoFit/>
-          </a:bodyPr>
-          <a:lstStyle/>
-          <a:p>
-            <a:pPr algn="l"/>
-            <a:r>
-              <a:rPr lang="en-US" b="0" i="0" dirty="0">
-                <a:solidFill>
-                  <a:schemeClr val="bg1"/>
-                </a:solidFill>
-                <a:effectLst/>
-                <a:latin typeface="Slack-Lato"/>
-              </a:rPr>
-              <a:t>Analysis – Michael[SPY] Ryan[AAPL]</a:t>
-            </a:r>
-            <a:br>
-              <a:rPr lang="en-US" b="0" i="0" dirty="0">
-                <a:solidFill>
-                  <a:schemeClr val="bg1"/>
-                </a:solidFill>
-                <a:effectLst/>
-                <a:latin typeface="Slack-Lato"/>
-              </a:rPr>
-            </a:br>
-            <a:endParaRPr lang="en-US" b="0" i="0" dirty="0">
-              <a:solidFill>
-                <a:schemeClr val="bg1"/>
-              </a:solidFill>
-              <a:effectLst/>
-              <a:latin typeface="Slack-Lato"/>
-            </a:endParaRPr>
-          </a:p>
-          <a:p>
-            <a:br>
-              <a:rPr lang="en-US" b="0" i="0" dirty="0">
-                <a:solidFill>
-                  <a:srgbClr val="1D1C1D"/>
-                </a:solidFill>
-                <a:effectLst/>
-                <a:latin typeface="Slack-Lato"/>
-              </a:rPr>
-            </a:br>
-            <a:endParaRPr lang="en-US" dirty="0"/>
-          </a:p>
-        </p:txBody>
-      </p:sp>
-      <p:sp>
-        <p:nvSpPr>
-          <p:cNvPr id="8" name="TextBox 7">
-            <a:extLst>
-              <a:ext uri="{FF2B5EF4-FFF2-40B4-BE49-F238E27FC236}">
-                <a16:creationId xmlns:a16="http://schemas.microsoft.com/office/drawing/2014/main" id="{38413B10-3FC5-14EC-7CFD-B97C2E54EE71}"/>
-              </a:ext>
-            </a:extLst>
-          </p:cNvPr>
-          <p:cNvSpPr txBox="1"/>
-          <p:nvPr/>
-        </p:nvSpPr>
-        <p:spPr>
-          <a:xfrm>
-            <a:off x="-2999234" y="2103970"/>
-            <a:ext cx="6093618" cy="923330"/>
-          </a:xfrm>
-          <a:prstGeom prst="rect">
-            <a:avLst/>
-          </a:prstGeom>
-          <a:noFill/>
-        </p:spPr>
-        <p:txBody>
-          <a:bodyPr wrap="square">
-            <a:spAutoFit/>
-          </a:bodyPr>
-          <a:lstStyle/>
-          <a:p>
-            <a:pPr algn="l"/>
-            <a:r>
-              <a:rPr lang="en-US" b="0" i="0" dirty="0">
-                <a:solidFill>
-                  <a:schemeClr val="bg1"/>
-                </a:solidFill>
-                <a:effectLst/>
-                <a:latin typeface="Slack-Lato"/>
-              </a:rPr>
-              <a:t>What were the outputs?</a:t>
-            </a:r>
-            <a:br>
-              <a:rPr lang="en-US" b="0" i="0" dirty="0">
-                <a:solidFill>
-                  <a:schemeClr val="bg1"/>
-                </a:solidFill>
-                <a:effectLst/>
-                <a:latin typeface="Slack-Lato"/>
-              </a:rPr>
-            </a:br>
-            <a:endParaRPr lang="en-US" b="0" i="0" dirty="0">
-              <a:solidFill>
-                <a:schemeClr val="bg1"/>
-              </a:solidFill>
-              <a:effectLst/>
-              <a:latin typeface="Slack-Lato"/>
-            </a:endParaRPr>
-          </a:p>
-          <a:p>
-            <a:pPr algn="l"/>
-            <a:r>
-              <a:rPr lang="en-US" b="0" i="0" dirty="0">
-                <a:solidFill>
-                  <a:schemeClr val="bg1"/>
-                </a:solidFill>
-                <a:effectLst/>
-                <a:latin typeface="Slack-Lato"/>
-              </a:rPr>
-              <a:t>What did the outputs tell us?</a:t>
-            </a:r>
-          </a:p>
-        </p:txBody>
-      </p:sp>
-      <p:sp>
-        <p:nvSpPr>
           <p:cNvPr id="12" name="TextBox 11">
             <a:extLst>
               <a:ext uri="{FF2B5EF4-FFF2-40B4-BE49-F238E27FC236}">
@@ -8363,10 +8236,10 @@
       </p:sp>
       <p:pic>
         <p:nvPicPr>
-          <p:cNvPr id="14" name="Picture 13">
-            <a:extLst>
-              <a:ext uri="{FF2B5EF4-FFF2-40B4-BE49-F238E27FC236}">
-                <a16:creationId xmlns:a16="http://schemas.microsoft.com/office/drawing/2014/main" id="{40D3834F-3113-E019-F14C-5910E9FD6646}"/>
+          <p:cNvPr id="10" name="Picture 9">
+            <a:extLst>
+              <a:ext uri="{FF2B5EF4-FFF2-40B4-BE49-F238E27FC236}">
+                <a16:creationId xmlns:a16="http://schemas.microsoft.com/office/drawing/2014/main" id="{193CABCB-71D4-37C0-81CD-532B0EA12B82}"/>
               </a:ext>
             </a:extLst>
           </p:cNvPr>
@@ -8383,8 +8256,8 @@
         </p:blipFill>
         <p:spPr>
           <a:xfrm>
-            <a:off x="1709737" y="2061349"/>
-            <a:ext cx="8767762" cy="4519250"/>
+            <a:off x="1705217" y="1955339"/>
+            <a:ext cx="8644644" cy="4635416"/>
           </a:xfrm>
           <a:prstGeom prst="rect">
             <a:avLst/>
@@ -8668,147 +8541,6 @@
       </p:sp>
       <p:sp>
         <p:nvSpPr>
-          <p:cNvPr id="7" name="TextBox 6">
-            <a:extLst>
-              <a:ext uri="{FF2B5EF4-FFF2-40B4-BE49-F238E27FC236}">
-                <a16:creationId xmlns:a16="http://schemas.microsoft.com/office/drawing/2014/main" id="{24C484EF-37A4-616D-7805-4B1637442430}"/>
-              </a:ext>
-            </a:extLst>
-          </p:cNvPr>
-          <p:cNvSpPr txBox="1"/>
-          <p:nvPr/>
-        </p:nvSpPr>
-        <p:spPr>
-          <a:xfrm>
-            <a:off x="-3525441" y="3306927"/>
-            <a:ext cx="3406379" cy="1477328"/>
-          </a:xfrm>
-          <a:prstGeom prst="rect">
-            <a:avLst/>
-          </a:prstGeom>
-          <a:noFill/>
-        </p:spPr>
-        <p:txBody>
-          <a:bodyPr wrap="square">
-            <a:spAutoFit/>
-          </a:bodyPr>
-          <a:lstStyle/>
-          <a:p>
-            <a:pPr algn="l"/>
-            <a:r>
-              <a:rPr lang="en-US" b="0" i="0" dirty="0">
-                <a:solidFill>
-                  <a:schemeClr val="bg1"/>
-                </a:solidFill>
-                <a:effectLst/>
-                <a:latin typeface="Slack-Lato"/>
-              </a:rPr>
-              <a:t>Analysis – Michael[SPY] Ryan[AAPL]</a:t>
-            </a:r>
-            <a:br>
-              <a:rPr lang="en-US" b="0" i="0" dirty="0">
-                <a:solidFill>
-                  <a:schemeClr val="bg1"/>
-                </a:solidFill>
-                <a:effectLst/>
-                <a:latin typeface="Slack-Lato"/>
-              </a:rPr>
-            </a:br>
-            <a:endParaRPr lang="en-US" b="0" i="0" dirty="0">
-              <a:solidFill>
-                <a:schemeClr val="bg1"/>
-              </a:solidFill>
-              <a:effectLst/>
-              <a:latin typeface="Slack-Lato"/>
-            </a:endParaRPr>
-          </a:p>
-          <a:p>
-            <a:br>
-              <a:rPr lang="en-US" b="0" i="0" dirty="0">
-                <a:solidFill>
-                  <a:srgbClr val="1D1C1D"/>
-                </a:solidFill>
-                <a:effectLst/>
-                <a:latin typeface="Slack-Lato"/>
-              </a:rPr>
-            </a:br>
-            <a:endParaRPr lang="en-US" dirty="0"/>
-          </a:p>
-        </p:txBody>
-      </p:sp>
-      <p:sp>
-        <p:nvSpPr>
-          <p:cNvPr id="8" name="TextBox 7">
-            <a:extLst>
-              <a:ext uri="{FF2B5EF4-FFF2-40B4-BE49-F238E27FC236}">
-                <a16:creationId xmlns:a16="http://schemas.microsoft.com/office/drawing/2014/main" id="{38413B10-3FC5-14EC-7CFD-B97C2E54EE71}"/>
-              </a:ext>
-            </a:extLst>
-          </p:cNvPr>
-          <p:cNvSpPr txBox="1"/>
-          <p:nvPr/>
-        </p:nvSpPr>
-        <p:spPr>
-          <a:xfrm>
-            <a:off x="-2999234" y="2103970"/>
-            <a:ext cx="6093618" cy="923330"/>
-          </a:xfrm>
-          <a:prstGeom prst="rect">
-            <a:avLst/>
-          </a:prstGeom>
-          <a:noFill/>
-        </p:spPr>
-        <p:txBody>
-          <a:bodyPr wrap="square">
-            <a:spAutoFit/>
-          </a:bodyPr>
-          <a:lstStyle/>
-          <a:p>
-            <a:pPr algn="l"/>
-            <a:r>
-              <a:rPr lang="en-US" b="0" i="0" dirty="0">
-                <a:solidFill>
-                  <a:schemeClr val="bg1"/>
-                </a:solidFill>
-                <a:effectLst/>
-                <a:latin typeface="Slack-Lato"/>
-              </a:rPr>
-              <a:t>What were the outputs?</a:t>
-            </a:r>
-            <a:br>
-              <a:rPr lang="en-US" b="0" i="0" dirty="0">
-                <a:solidFill>
-                  <a:schemeClr val="bg1"/>
-                </a:solidFill>
-                <a:effectLst/>
-                <a:latin typeface="Slack-Lato"/>
-              </a:rPr>
-            </a:br>
-            <a:endParaRPr lang="en-US" b="0" i="0" dirty="0">
-              <a:solidFill>
-                <a:schemeClr val="bg1"/>
-              </a:solidFill>
-              <a:effectLst/>
-              <a:latin typeface="Slack-Lato"/>
-            </a:endParaRPr>
-          </a:p>
-          <a:p>
-            <a:pPr algn="l"/>
-            <a:r>
-              <a:rPr lang="en-US" b="0" i="0" dirty="0">
-                <a:solidFill>
-                  <a:schemeClr val="bg1"/>
-                </a:solidFill>
-                <a:effectLst/>
-                <a:latin typeface="Slack-Lato"/>
-              </a:rPr>
-              <a:t>What did the outputs tell us?</a:t>
-            </a:r>
-          </a:p>
-        </p:txBody>
-      </p:sp>
-      <p:sp>
-        <p:nvSpPr>
           <p:cNvPr id="12" name="TextBox 11">
             <a:extLst>
               <a:ext uri="{FF2B5EF4-FFF2-40B4-BE49-F238E27FC236}">
@@ -8875,8 +8607,8 @@
         </p:nvSpPr>
         <p:spPr>
           <a:xfrm>
-            <a:off x="318492" y="1378036"/>
-            <a:ext cx="11240096" cy="923330"/>
+            <a:off x="282178" y="1309008"/>
+            <a:ext cx="11490722" cy="646331"/>
           </a:xfrm>
           <a:prstGeom prst="rect">
             <a:avLst/>
@@ -8899,17 +8631,17 @@
                 <a:latin typeface="Arial" panose="020B0604020202020204" pitchFamily="34" charset="0"/>
                 <a:cs typeface="Arial" panose="020B0604020202020204" pitchFamily="34" charset="0"/>
               </a:rPr>
-              <a:t>In this last graph you can see a better picture of when we buy and sell.  For example, we started with buying at the open, then the MACD passes the signal line we sell until it passes it again. At approximately 1:45 the signal line is indicating a upwards trend where we buy until it crosses again to indicate that we sell. </a:t>
+              <a:t>This is the signal line. We start off buying at the open, then when the MACD line pass the signal line we sell because the signal line is indicating a downwards trend.</a:t>
             </a:r>
           </a:p>
         </p:txBody>
       </p:sp>
       <p:pic>
         <p:nvPicPr>
-          <p:cNvPr id="14" name="Picture 13">
-            <a:extLst>
-              <a:ext uri="{FF2B5EF4-FFF2-40B4-BE49-F238E27FC236}">
-                <a16:creationId xmlns:a16="http://schemas.microsoft.com/office/drawing/2014/main" id="{91BFAFC5-6049-8A56-A7C9-67686C0F4FDD}"/>
+          <p:cNvPr id="7" name="Picture 6">
+            <a:extLst>
+              <a:ext uri="{FF2B5EF4-FFF2-40B4-BE49-F238E27FC236}">
+                <a16:creationId xmlns:a16="http://schemas.microsoft.com/office/drawing/2014/main" id="{F58A42AF-9850-CA0C-37A2-61780B2D26F5}"/>
               </a:ext>
             </a:extLst>
           </p:cNvPr>
@@ -8926,8 +8658,8 @@
         </p:blipFill>
         <p:spPr>
           <a:xfrm>
-            <a:off x="1984370" y="2381732"/>
-            <a:ext cx="8218495" cy="4189884"/>
+            <a:off x="2312435" y="2012951"/>
+            <a:ext cx="7430208" cy="4621227"/>
           </a:xfrm>
           <a:prstGeom prst="rect">
             <a:avLst/>
@@ -8937,7 +8669,7 @@
     </p:spTree>
     <p:extLst>
       <p:ext uri="{BB962C8B-B14F-4D97-AF65-F5344CB8AC3E}">
-        <p14:creationId xmlns:p14="http://schemas.microsoft.com/office/powerpoint/2010/main" val="2179045673"/>
+        <p14:creationId xmlns:p14="http://schemas.microsoft.com/office/powerpoint/2010/main" val="1598778529"/>
       </p:ext>
     </p:extLst>
   </p:cSld>
@@ -8948,7 +8680,7 @@
 </file>
 
 <file path=ppt/slides/slide18.xml><?xml version="1.0" encoding="utf-8"?>
-<p:sld xmlns:a="http://schemas.openxmlformats.org/drawingml/2006/main" xmlns:r="http://schemas.openxmlformats.org/officeDocument/2006/relationships" xmlns:p="http://schemas.openxmlformats.org/presentationml/2006/main">
+<p:sld xmlns:a="http://schemas.openxmlformats.org/drawingml/2006/main" xmlns:r="http://schemas.openxmlformats.org/officeDocument/2006/relationships" xmlns:p="http://schemas.openxmlformats.org/presentationml/2006/main" show="0">
   <p:cSld>
     <p:spTree>
       <p:nvGrpSpPr>
@@ -9211,10 +8943,10 @@
       </p:sp>
       <p:sp>
         <p:nvSpPr>
-          <p:cNvPr id="15" name="TextBox 14">
-            <a:extLst>
-              <a:ext uri="{FF2B5EF4-FFF2-40B4-BE49-F238E27FC236}">
-                <a16:creationId xmlns:a16="http://schemas.microsoft.com/office/drawing/2014/main" id="{FCBFDD02-51CC-AC9F-F897-ED1643C6B457}"/>
+          <p:cNvPr id="7" name="TextBox 6">
+            <a:extLst>
+              <a:ext uri="{FF2B5EF4-FFF2-40B4-BE49-F238E27FC236}">
+                <a16:creationId xmlns:a16="http://schemas.microsoft.com/office/drawing/2014/main" id="{24C484EF-37A4-616D-7805-4B1637442430}"/>
               </a:ext>
             </a:extLst>
           </p:cNvPr>
@@ -9223,8 +8955,149 @@
         </p:nvSpPr>
         <p:spPr>
           <a:xfrm>
+            <a:off x="-3525441" y="3306927"/>
+            <a:ext cx="3406379" cy="1477328"/>
+          </a:xfrm>
+          <a:prstGeom prst="rect">
+            <a:avLst/>
+          </a:prstGeom>
+          <a:noFill/>
+        </p:spPr>
+        <p:txBody>
+          <a:bodyPr wrap="square">
+            <a:spAutoFit/>
+          </a:bodyPr>
+          <a:lstStyle/>
+          <a:p>
+            <a:pPr algn="l"/>
+            <a:r>
+              <a:rPr lang="en-US" b="0" i="0" dirty="0">
+                <a:solidFill>
+                  <a:schemeClr val="bg1"/>
+                </a:solidFill>
+                <a:effectLst/>
+                <a:latin typeface="Slack-Lato"/>
+              </a:rPr>
+              <a:t>Analysis – Michael[SPY] Ryan[AAPL]</a:t>
+            </a:r>
+            <a:br>
+              <a:rPr lang="en-US" b="0" i="0" dirty="0">
+                <a:solidFill>
+                  <a:schemeClr val="bg1"/>
+                </a:solidFill>
+                <a:effectLst/>
+                <a:latin typeface="Slack-Lato"/>
+              </a:rPr>
+            </a:br>
+            <a:endParaRPr lang="en-US" b="0" i="0" dirty="0">
+              <a:solidFill>
+                <a:schemeClr val="bg1"/>
+              </a:solidFill>
+              <a:effectLst/>
+              <a:latin typeface="Slack-Lato"/>
+            </a:endParaRPr>
+          </a:p>
+          <a:p>
+            <a:br>
+              <a:rPr lang="en-US" b="0" i="0" dirty="0">
+                <a:solidFill>
+                  <a:srgbClr val="1D1C1D"/>
+                </a:solidFill>
+                <a:effectLst/>
+                <a:latin typeface="Slack-Lato"/>
+              </a:rPr>
+            </a:br>
+            <a:endParaRPr lang="en-US" dirty="0"/>
+          </a:p>
+        </p:txBody>
+      </p:sp>
+      <p:sp>
+        <p:nvSpPr>
+          <p:cNvPr id="8" name="TextBox 7">
+            <a:extLst>
+              <a:ext uri="{FF2B5EF4-FFF2-40B4-BE49-F238E27FC236}">
+                <a16:creationId xmlns:a16="http://schemas.microsoft.com/office/drawing/2014/main" id="{38413B10-3FC5-14EC-7CFD-B97C2E54EE71}"/>
+              </a:ext>
+            </a:extLst>
+          </p:cNvPr>
+          <p:cNvSpPr txBox="1"/>
+          <p:nvPr/>
+        </p:nvSpPr>
+        <p:spPr>
+          <a:xfrm>
+            <a:off x="-2999234" y="2103970"/>
+            <a:ext cx="6093618" cy="923330"/>
+          </a:xfrm>
+          <a:prstGeom prst="rect">
+            <a:avLst/>
+          </a:prstGeom>
+          <a:noFill/>
+        </p:spPr>
+        <p:txBody>
+          <a:bodyPr wrap="square">
+            <a:spAutoFit/>
+          </a:bodyPr>
+          <a:lstStyle/>
+          <a:p>
+            <a:pPr algn="l"/>
+            <a:r>
+              <a:rPr lang="en-US" b="0" i="0" dirty="0">
+                <a:solidFill>
+                  <a:schemeClr val="bg1"/>
+                </a:solidFill>
+                <a:effectLst/>
+                <a:latin typeface="Slack-Lato"/>
+              </a:rPr>
+              <a:t>What were the outputs?</a:t>
+            </a:r>
+            <a:br>
+              <a:rPr lang="en-US" b="0" i="0" dirty="0">
+                <a:solidFill>
+                  <a:schemeClr val="bg1"/>
+                </a:solidFill>
+                <a:effectLst/>
+                <a:latin typeface="Slack-Lato"/>
+              </a:rPr>
+            </a:br>
+            <a:endParaRPr lang="en-US" b="0" i="0" dirty="0">
+              <a:solidFill>
+                <a:schemeClr val="bg1"/>
+              </a:solidFill>
+              <a:effectLst/>
+              <a:latin typeface="Slack-Lato"/>
+            </a:endParaRPr>
+          </a:p>
+          <a:p>
+            <a:pPr algn="l"/>
+            <a:r>
+              <a:rPr lang="en-US" b="0" i="0" dirty="0">
+                <a:solidFill>
+                  <a:schemeClr val="bg1"/>
+                </a:solidFill>
+                <a:effectLst/>
+                <a:latin typeface="Slack-Lato"/>
+              </a:rPr>
+              <a:t>What did the outputs tell us?</a:t>
+            </a:r>
+          </a:p>
+        </p:txBody>
+      </p:sp>
+      <p:sp>
+        <p:nvSpPr>
+          <p:cNvPr id="12" name="TextBox 11">
+            <a:extLst>
+              <a:ext uri="{FF2B5EF4-FFF2-40B4-BE49-F238E27FC236}">
+                <a16:creationId xmlns:a16="http://schemas.microsoft.com/office/drawing/2014/main" id="{0F3E3CE8-0878-0354-74CE-9ACDA279CCCD}"/>
+              </a:ext>
+            </a:extLst>
+          </p:cNvPr>
+          <p:cNvSpPr txBox="1"/>
+          <p:nvPr/>
+        </p:nvSpPr>
+        <p:spPr>
+          <a:xfrm>
             <a:off x="7886700" y="112991"/>
-            <a:ext cx="4186239" cy="738664"/>
+            <a:ext cx="4186239" cy="523220"/>
           </a:xfrm>
           <a:prstGeom prst="rect">
             <a:avLst/>
@@ -9248,41 +9121,8 @@
                 <a:latin typeface="Arial" panose="020B0604020202020204" pitchFamily="34" charset="0"/>
                 <a:cs typeface="Arial" panose="020B0604020202020204" pitchFamily="34" charset="0"/>
               </a:rPr>
-              <a:t>Briefer: Michael </a:t>
-            </a:r>
-            <a:r>
-              <a:rPr lang="en-US" sz="1400" i="1" dirty="0" err="1">
-                <a:solidFill>
-                  <a:schemeClr val="bg1">
-                    <a:lumMod val="75000"/>
-                  </a:schemeClr>
-                </a:solidFill>
-                <a:latin typeface="Arial" panose="020B0604020202020204" pitchFamily="34" charset="0"/>
-                <a:cs typeface="Arial" panose="020B0604020202020204" pitchFamily="34" charset="0"/>
-              </a:rPr>
-              <a:t>Drinkard</a:t>
-            </a:r>
-            <a:endParaRPr lang="en-US" sz="1400" i="1" dirty="0">
-              <a:solidFill>
-                <a:schemeClr val="bg1">
-                  <a:lumMod val="75000"/>
-                </a:schemeClr>
-              </a:solidFill>
-              <a:latin typeface="Arial" panose="020B0604020202020204" pitchFamily="34" charset="0"/>
-              <a:cs typeface="Arial" panose="020B0604020202020204" pitchFamily="34" charset="0"/>
-            </a:endParaRPr>
-          </a:p>
-          <a:p>
-            <a:pPr algn="r"/>
-            <a:endParaRPr lang="en-US" sz="1400" dirty="0">
-              <a:solidFill>
-                <a:schemeClr val="bg1">
-                  <a:lumMod val="75000"/>
-                </a:schemeClr>
-              </a:solidFill>
-              <a:latin typeface="Arial" panose="020B0604020202020204" pitchFamily="34" charset="0"/>
-              <a:cs typeface="Arial" panose="020B0604020202020204" pitchFamily="34" charset="0"/>
-            </a:endParaRPr>
+              <a:t>Briefer: Ryan Stowers</a:t>
+            </a:r>
           </a:p>
           <a:p>
             <a:pPr algn="r"/>
@@ -9298,10 +9138,10 @@
       </p:sp>
       <p:sp>
         <p:nvSpPr>
-          <p:cNvPr id="6" name="TextBox 5">
-            <a:extLst>
-              <a:ext uri="{FF2B5EF4-FFF2-40B4-BE49-F238E27FC236}">
-                <a16:creationId xmlns:a16="http://schemas.microsoft.com/office/drawing/2014/main" id="{26096104-3AB8-C326-EFD0-6D5223ADAE2A}"/>
+          <p:cNvPr id="13" name="TextBox 12">
+            <a:extLst>
+              <a:ext uri="{FF2B5EF4-FFF2-40B4-BE49-F238E27FC236}">
+                <a16:creationId xmlns:a16="http://schemas.microsoft.com/office/drawing/2014/main" id="{5934E4D6-40A6-1091-2230-929980990F95}"/>
               </a:ext>
             </a:extLst>
           </p:cNvPr>
@@ -9310,8 +9150,8 @@
         </p:nvSpPr>
         <p:spPr>
           <a:xfrm>
-            <a:off x="3872508" y="1845822"/>
-            <a:ext cx="8924330" cy="3954929"/>
+            <a:off x="318492" y="1378036"/>
+            <a:ext cx="11240096" cy="923330"/>
           </a:xfrm>
           <a:prstGeom prst="rect">
             <a:avLst/>
@@ -9324,184 +9164,55 @@
           </a:bodyPr>
           <a:lstStyle/>
           <a:p>
-            <a:pPr marL="285750" indent="-285750">
-              <a:buFont typeface="Arial" panose="020B0604020202020204" pitchFamily="34" charset="0"/>
-              <a:buChar char="•"/>
-            </a:pPr>
-            <a:r>
-              <a:rPr lang="en-US" sz="2400" dirty="0">
+            <a:r>
+              <a:rPr lang="en-US" dirty="0">
                 <a:solidFill>
                   <a:schemeClr val="bg1">
-                    <a:lumMod val="75000"/>
+                    <a:lumMod val="85000"/>
                   </a:schemeClr>
                 </a:solidFill>
                 <a:latin typeface="Arial" panose="020B0604020202020204" pitchFamily="34" charset="0"/>
                 <a:cs typeface="Arial" panose="020B0604020202020204" pitchFamily="34" charset="0"/>
               </a:rPr>
-              <a:t>What did we see?</a:t>
-            </a:r>
-          </a:p>
-          <a:p>
-            <a:pPr marL="285750" indent="-285750">
-              <a:buFont typeface="Arial" panose="020B0604020202020204" pitchFamily="34" charset="0"/>
-              <a:buChar char="•"/>
-            </a:pPr>
-            <a:endParaRPr lang="en-US" sz="2400" dirty="0">
-              <a:solidFill>
-                <a:schemeClr val="bg1">
-                  <a:lumMod val="75000"/>
-                </a:schemeClr>
-              </a:solidFill>
-              <a:latin typeface="Arial" panose="020B0604020202020204" pitchFamily="34" charset="0"/>
-              <a:cs typeface="Arial" panose="020B0604020202020204" pitchFamily="34" charset="0"/>
-            </a:endParaRPr>
-          </a:p>
-          <a:p>
-            <a:pPr marL="285750" indent="-285750">
-              <a:buFont typeface="Arial" panose="020B0604020202020204" pitchFamily="34" charset="0"/>
-              <a:buChar char="•"/>
-            </a:pPr>
-            <a:endParaRPr lang="en-US" sz="2400" dirty="0">
-              <a:solidFill>
-                <a:schemeClr val="bg1">
-                  <a:lumMod val="75000"/>
-                </a:schemeClr>
-              </a:solidFill>
-              <a:latin typeface="Arial" panose="020B0604020202020204" pitchFamily="34" charset="0"/>
-              <a:cs typeface="Arial" panose="020B0604020202020204" pitchFamily="34" charset="0"/>
-            </a:endParaRPr>
-          </a:p>
-          <a:p>
-            <a:pPr marL="285750" indent="-285750">
-              <a:buFont typeface="Arial" panose="020B0604020202020204" pitchFamily="34" charset="0"/>
-              <a:buChar char="•"/>
-            </a:pPr>
-            <a:r>
-              <a:rPr lang="en-US" sz="2400" dirty="0">
-                <a:solidFill>
-                  <a:schemeClr val="bg1">
-                    <a:lumMod val="75000"/>
-                  </a:schemeClr>
-                </a:solidFill>
-                <a:latin typeface="Arial" panose="020B0604020202020204" pitchFamily="34" charset="0"/>
-                <a:cs typeface="Arial" panose="020B0604020202020204" pitchFamily="34" charset="0"/>
-              </a:rPr>
-              <a:t>Why did we see it? </a:t>
-            </a:r>
-          </a:p>
-          <a:p>
-            <a:pPr marL="285750" indent="-285750">
-              <a:buFont typeface="Arial" panose="020B0604020202020204" pitchFamily="34" charset="0"/>
-              <a:buChar char="•"/>
-            </a:pPr>
-            <a:endParaRPr lang="en-US" sz="2400" dirty="0">
-              <a:solidFill>
-                <a:schemeClr val="bg1">
-                  <a:lumMod val="75000"/>
-                </a:schemeClr>
-              </a:solidFill>
-              <a:latin typeface="Arial" panose="020B0604020202020204" pitchFamily="34" charset="0"/>
-              <a:cs typeface="Arial" panose="020B0604020202020204" pitchFamily="34" charset="0"/>
-            </a:endParaRPr>
-          </a:p>
-          <a:p>
-            <a:pPr marL="285750" indent="-285750">
-              <a:buFont typeface="Arial" panose="020B0604020202020204" pitchFamily="34" charset="0"/>
-              <a:buChar char="•"/>
-            </a:pPr>
-            <a:endParaRPr lang="en-US" sz="2400" dirty="0">
-              <a:solidFill>
-                <a:schemeClr val="bg1">
-                  <a:lumMod val="75000"/>
-                </a:schemeClr>
-              </a:solidFill>
-              <a:latin typeface="Arial" panose="020B0604020202020204" pitchFamily="34" charset="0"/>
-              <a:cs typeface="Arial" panose="020B0604020202020204" pitchFamily="34" charset="0"/>
-            </a:endParaRPr>
-          </a:p>
-          <a:p>
-            <a:pPr marL="285750" indent="-285750">
-              <a:buFont typeface="Arial" panose="020B0604020202020204" pitchFamily="34" charset="0"/>
-              <a:buChar char="•"/>
-            </a:pPr>
-            <a:r>
-              <a:rPr lang="en-US" sz="2400" dirty="0">
-                <a:solidFill>
-                  <a:schemeClr val="bg1">
-                    <a:lumMod val="75000"/>
-                  </a:schemeClr>
-                </a:solidFill>
-                <a:latin typeface="Arial" panose="020B0604020202020204" pitchFamily="34" charset="0"/>
-                <a:cs typeface="Arial" panose="020B0604020202020204" pitchFamily="34" charset="0"/>
-              </a:rPr>
-              <a:t>Did we make money?</a:t>
-            </a:r>
-          </a:p>
-          <a:p>
-            <a:pPr marL="285750" indent="-285750">
-              <a:buFont typeface="Arial" panose="020B0604020202020204" pitchFamily="34" charset="0"/>
-              <a:buChar char="•"/>
-            </a:pPr>
-            <a:endParaRPr lang="en-US" sz="2400" dirty="0">
-              <a:solidFill>
-                <a:schemeClr val="bg1">
-                  <a:lumMod val="75000"/>
-                </a:schemeClr>
-              </a:solidFill>
-              <a:latin typeface="Arial" panose="020B0604020202020204" pitchFamily="34" charset="0"/>
-              <a:cs typeface="Arial" panose="020B0604020202020204" pitchFamily="34" charset="0"/>
-            </a:endParaRPr>
-          </a:p>
-          <a:p>
-            <a:pPr marL="285750" indent="-285750">
-              <a:buFont typeface="Arial" panose="020B0604020202020204" pitchFamily="34" charset="0"/>
-              <a:buChar char="•"/>
-            </a:pPr>
-            <a:endParaRPr lang="en-US" sz="2400" dirty="0">
-              <a:solidFill>
-                <a:schemeClr val="bg1">
-                  <a:lumMod val="75000"/>
-                </a:schemeClr>
-              </a:solidFill>
-              <a:latin typeface="Arial" panose="020B0604020202020204" pitchFamily="34" charset="0"/>
-              <a:cs typeface="Arial" panose="020B0604020202020204" pitchFamily="34" charset="0"/>
-            </a:endParaRPr>
-          </a:p>
-          <a:p>
-            <a:pPr marL="285750" indent="-285750">
-              <a:buFont typeface="Arial" panose="020B0604020202020204" pitchFamily="34" charset="0"/>
-              <a:buChar char="•"/>
-            </a:pPr>
-            <a:r>
-              <a:rPr lang="en-US" sz="2400" dirty="0">
-                <a:solidFill>
-                  <a:schemeClr val="bg1">
-                    <a:lumMod val="75000"/>
-                  </a:schemeClr>
-                </a:solidFill>
-                <a:latin typeface="Arial" panose="020B0604020202020204" pitchFamily="34" charset="0"/>
-                <a:cs typeface="Arial" panose="020B0604020202020204" pitchFamily="34" charset="0"/>
-              </a:rPr>
-              <a:t>Why did we make money or lose money?</a:t>
-            </a:r>
-          </a:p>
-          <a:p>
-            <a:endParaRPr lang="en-US" sz="1100" dirty="0">
-              <a:solidFill>
-                <a:schemeClr val="bg1">
-                  <a:lumMod val="85000"/>
-                </a:schemeClr>
-              </a:solidFill>
-              <a:latin typeface="Arial" panose="020B0604020202020204" pitchFamily="34" charset="0"/>
-              <a:cs typeface="Arial" panose="020B0604020202020204" pitchFamily="34" charset="0"/>
-            </a:endParaRPr>
-          </a:p>
-        </p:txBody>
-      </p:sp>
+              <a:t>In this last graph you can see a better picture of when we buy and sell.  For example, we started with buying at the open, then the MACD passes the signal line we sell until it passes it again. At approximately 1:45 the signal line is indicating a upwards trend where we buy until it crosses again to indicate that we sell. </a:t>
+            </a:r>
+          </a:p>
+        </p:txBody>
+      </p:sp>
+      <p:pic>
+        <p:nvPicPr>
+          <p:cNvPr id="14" name="Picture 13">
+            <a:extLst>
+              <a:ext uri="{FF2B5EF4-FFF2-40B4-BE49-F238E27FC236}">
+                <a16:creationId xmlns:a16="http://schemas.microsoft.com/office/drawing/2014/main" id="{91BFAFC5-6049-8A56-A7C9-67686C0F4FDD}"/>
+              </a:ext>
+            </a:extLst>
+          </p:cNvPr>
+          <p:cNvPicPr>
+            <a:picLocks noChangeAspect="1"/>
+          </p:cNvPicPr>
+          <p:nvPr/>
+        </p:nvPicPr>
+        <p:blipFill>
+          <a:blip r:embed="rId2"/>
+          <a:stretch>
+            <a:fillRect/>
+          </a:stretch>
+        </p:blipFill>
+        <p:spPr>
+          <a:xfrm>
+            <a:off x="1984370" y="2381732"/>
+            <a:ext cx="8218495" cy="4189884"/>
+          </a:xfrm>
+          <a:prstGeom prst="rect">
+            <a:avLst/>
+          </a:prstGeom>
+        </p:spPr>
+      </p:pic>
     </p:spTree>
     <p:extLst>
       <p:ext uri="{BB962C8B-B14F-4D97-AF65-F5344CB8AC3E}">
-        <p14:creationId xmlns:p14="http://schemas.microsoft.com/office/powerpoint/2010/main" val="817477383"/>
+        <p14:creationId xmlns:p14="http://schemas.microsoft.com/office/powerpoint/2010/main" val="2179045673"/>
       </p:ext>
     </p:extLst>
   </p:cSld>
@@ -9768,17 +9479,17 @@
                 <a:latin typeface="Arial" panose="020B0604020202020204" pitchFamily="34" charset="0"/>
                 <a:cs typeface="Arial" panose="020B0604020202020204" pitchFamily="34" charset="0"/>
               </a:rPr>
-              <a:t>Lessons Learned</a:t>
-            </a:r>
-          </a:p>
-        </p:txBody>
-      </p:sp>
-      <p:sp>
-        <p:nvSpPr>
-          <p:cNvPr id="6" name="TextBox 5">
-            <a:extLst>
-              <a:ext uri="{FF2B5EF4-FFF2-40B4-BE49-F238E27FC236}">
-                <a16:creationId xmlns:a16="http://schemas.microsoft.com/office/drawing/2014/main" id="{B31D4CA7-C4C5-98E5-6FA6-41CDEC2E70A7}"/>
+              <a:t>Analysis &amp; Outputs</a:t>
+            </a:r>
+          </a:p>
+        </p:txBody>
+      </p:sp>
+      <p:sp>
+        <p:nvSpPr>
+          <p:cNvPr id="15" name="TextBox 14">
+            <a:extLst>
+              <a:ext uri="{FF2B5EF4-FFF2-40B4-BE49-F238E27FC236}">
+                <a16:creationId xmlns:a16="http://schemas.microsoft.com/office/drawing/2014/main" id="{FCBFDD02-51CC-AC9F-F897-ED1643C6B457}"/>
               </a:ext>
             </a:extLst>
           </p:cNvPr>
@@ -9788,7 +9499,7 @@
         <p:spPr>
           <a:xfrm>
             <a:off x="7886700" y="112991"/>
-            <a:ext cx="4186239" cy="523220"/>
+            <a:ext cx="4186239" cy="738664"/>
           </a:xfrm>
           <a:prstGeom prst="rect">
             <a:avLst/>
@@ -9840,6 +9551,18 @@
             <a:pPr algn="r"/>
             <a:endParaRPr lang="en-US" sz="1400" dirty="0">
               <a:solidFill>
+                <a:schemeClr val="bg1">
+                  <a:lumMod val="75000"/>
+                </a:schemeClr>
+              </a:solidFill>
+              <a:latin typeface="Arial" panose="020B0604020202020204" pitchFamily="34" charset="0"/>
+              <a:cs typeface="Arial" panose="020B0604020202020204" pitchFamily="34" charset="0"/>
+            </a:endParaRPr>
+          </a:p>
+          <a:p>
+            <a:pPr algn="r"/>
+            <a:endParaRPr lang="en-US" sz="1400" dirty="0">
+              <a:solidFill>
                 <a:schemeClr val="bg1"/>
               </a:solidFill>
               <a:latin typeface="Arial" panose="020B0604020202020204" pitchFamily="34" charset="0"/>
@@ -9850,10 +9573,10 @@
       </p:sp>
       <p:sp>
         <p:nvSpPr>
-          <p:cNvPr id="10" name="TextBox 9">
-            <a:extLst>
-              <a:ext uri="{FF2B5EF4-FFF2-40B4-BE49-F238E27FC236}">
-                <a16:creationId xmlns:a16="http://schemas.microsoft.com/office/drawing/2014/main" id="{BD950A60-DECC-F2E1-1C7F-BB10521448F5}"/>
+          <p:cNvPr id="6" name="TextBox 5">
+            <a:extLst>
+              <a:ext uri="{FF2B5EF4-FFF2-40B4-BE49-F238E27FC236}">
+                <a16:creationId xmlns:a16="http://schemas.microsoft.com/office/drawing/2014/main" id="{26096104-3AB8-C326-EFD0-6D5223ADAE2A}"/>
               </a:ext>
             </a:extLst>
           </p:cNvPr>
@@ -9862,8 +9585,8 @@
         </p:nvSpPr>
         <p:spPr>
           <a:xfrm>
-            <a:off x="870347" y="2150566"/>
-            <a:ext cx="11321654" cy="3477875"/>
+            <a:off x="3872508" y="1845822"/>
+            <a:ext cx="8924330" cy="3954929"/>
           </a:xfrm>
           <a:prstGeom prst="rect">
             <a:avLst/>
@@ -9871,13 +9594,17 @@
           <a:noFill/>
         </p:spPr>
         <p:txBody>
-          <a:bodyPr wrap="square" rtlCol="0">
+          <a:bodyPr wrap="square">
             <a:spAutoFit/>
           </a:bodyPr>
           <a:lstStyle/>
           <a:p>
-            <a:r>
-              <a:rPr lang="en-US" sz="2000" b="1" i="1" dirty="0">
+            <a:pPr marL="285750" indent="-285750">
+              <a:buFont typeface="Arial" panose="020B0604020202020204" pitchFamily="34" charset="0"/>
+              <a:buChar char="•"/>
+            </a:pPr>
+            <a:r>
+              <a:rPr lang="en-US" sz="2400" dirty="0">
                 <a:solidFill>
                   <a:schemeClr val="bg1">
                     <a:lumMod val="75000"/>
@@ -9886,11 +9613,15 @@
                 <a:latin typeface="Arial" panose="020B0604020202020204" pitchFamily="34" charset="0"/>
                 <a:cs typeface="Arial" panose="020B0604020202020204" pitchFamily="34" charset="0"/>
               </a:rPr>
-              <a:t>What we did well:  </a:t>
-            </a:r>
-          </a:p>
-          <a:p>
-            <a:endParaRPr lang="en-US" sz="2000" dirty="0">
+              <a:t>What did we see?</a:t>
+            </a:r>
+          </a:p>
+          <a:p>
+            <a:pPr marL="285750" indent="-285750">
+              <a:buFont typeface="Arial" panose="020B0604020202020204" pitchFamily="34" charset="0"/>
+              <a:buChar char="•"/>
+            </a:pPr>
+            <a:endParaRPr lang="en-US" sz="2400" dirty="0">
               <a:solidFill>
                 <a:schemeClr val="bg1">
                   <a:lumMod val="75000"/>
@@ -9901,25 +9632,11 @@
             </a:endParaRPr>
           </a:p>
           <a:p>
-            <a:pPr marL="742950" lvl="1" indent="-285750">
+            <a:pPr marL="285750" indent="-285750">
               <a:buFont typeface="Arial" panose="020B0604020202020204" pitchFamily="34" charset="0"/>
               <a:buChar char="•"/>
             </a:pPr>
-            <a:r>
-              <a:rPr lang="en-US" sz="2000" dirty="0">
-                <a:solidFill>
-                  <a:schemeClr val="bg1">
-                    <a:lumMod val="75000"/>
-                  </a:schemeClr>
-                </a:solidFill>
-                <a:latin typeface="Arial" panose="020B0604020202020204" pitchFamily="34" charset="0"/>
-                <a:cs typeface="Arial" panose="020B0604020202020204" pitchFamily="34" charset="0"/>
-              </a:rPr>
-              <a:t>We successfully created a signal that tells the computer to buy or sell</a:t>
-            </a:r>
-          </a:p>
-          <a:p>
-            <a:endParaRPr lang="en-US" sz="2000" dirty="0">
+            <a:endParaRPr lang="en-US" sz="2400" dirty="0">
               <a:solidFill>
                 <a:schemeClr val="bg1">
                   <a:lumMod val="75000"/>
@@ -9930,7 +9647,29 @@
             </a:endParaRPr>
           </a:p>
           <a:p>
-            <a:endParaRPr lang="en-US" sz="2000" dirty="0">
+            <a:pPr marL="285750" indent="-285750">
+              <a:buFont typeface="Arial" panose="020B0604020202020204" pitchFamily="34" charset="0"/>
+              <a:buChar char="•"/>
+            </a:pPr>
+            <a:r>
+              <a:rPr lang="en-US" sz="2400" dirty="0">
+                <a:solidFill>
+                  <a:schemeClr val="bg1">
+                    <a:lumMod val="75000"/>
+                  </a:schemeClr>
+                </a:solidFill>
+                <a:latin typeface="Arial" panose="020B0604020202020204" pitchFamily="34" charset="0"/>
+                <a:cs typeface="Arial" panose="020B0604020202020204" pitchFamily="34" charset="0"/>
+              </a:rPr>
+              <a:t>Why did we see it? </a:t>
+            </a:r>
+          </a:p>
+          <a:p>
+            <a:pPr marL="285750" indent="-285750">
+              <a:buFont typeface="Arial" panose="020B0604020202020204" pitchFamily="34" charset="0"/>
+              <a:buChar char="•"/>
+            </a:pPr>
+            <a:endParaRPr lang="en-US" sz="2400" dirty="0">
               <a:solidFill>
                 <a:schemeClr val="bg1">
                   <a:lumMod val="75000"/>
@@ -9941,7 +9680,11 @@
             </a:endParaRPr>
           </a:p>
           <a:p>
-            <a:endParaRPr lang="en-US" sz="2000" b="1" i="1" dirty="0">
+            <a:pPr marL="285750" indent="-285750">
+              <a:buFont typeface="Arial" panose="020B0604020202020204" pitchFamily="34" charset="0"/>
+              <a:buChar char="•"/>
+            </a:pPr>
+            <a:endParaRPr lang="en-US" sz="2400" dirty="0">
               <a:solidFill>
                 <a:schemeClr val="bg1">
                   <a:lumMod val="75000"/>
@@ -9952,8 +9695,12 @@
             </a:endParaRPr>
           </a:p>
           <a:p>
-            <a:r>
-              <a:rPr lang="en-US" sz="2000" b="1" i="1" dirty="0">
+            <a:pPr marL="285750" indent="-285750">
+              <a:buFont typeface="Arial" panose="020B0604020202020204" pitchFamily="34" charset="0"/>
+              <a:buChar char="•"/>
+            </a:pPr>
+            <a:r>
+              <a:rPr lang="en-US" sz="2400" dirty="0">
                 <a:solidFill>
                   <a:schemeClr val="bg1">
                     <a:lumMod val="75000"/>
@@ -9962,15 +9709,15 @@
                 <a:latin typeface="Arial" panose="020B0604020202020204" pitchFamily="34" charset="0"/>
                 <a:cs typeface="Arial" panose="020B0604020202020204" pitchFamily="34" charset="0"/>
               </a:rPr>
-              <a:t>What we can do better:</a:t>
-            </a:r>
-          </a:p>
-          <a:p>
-            <a:pPr marL="742950" lvl="1" indent="-285750">
+              <a:t>Did we make money?</a:t>
+            </a:r>
+          </a:p>
+          <a:p>
+            <a:pPr marL="285750" indent="-285750">
               <a:buFont typeface="Arial" panose="020B0604020202020204" pitchFamily="34" charset="0"/>
               <a:buChar char="•"/>
             </a:pPr>
-            <a:endParaRPr lang="en-US" sz="2000" dirty="0">
+            <a:endParaRPr lang="en-US" sz="2400" dirty="0">
               <a:solidFill>
                 <a:schemeClr val="bg1">
                   <a:lumMod val="75000"/>
@@ -9981,25 +9728,11 @@
             </a:endParaRPr>
           </a:p>
           <a:p>
-            <a:pPr marL="742950" lvl="1" indent="-285750">
+            <a:pPr marL="285750" indent="-285750">
               <a:buFont typeface="Arial" panose="020B0604020202020204" pitchFamily="34" charset="0"/>
               <a:buChar char="•"/>
             </a:pPr>
-            <a:r>
-              <a:rPr lang="en-US" sz="2000" dirty="0">
-                <a:solidFill>
-                  <a:schemeClr val="bg1">
-                    <a:lumMod val="75000"/>
-                  </a:schemeClr>
-                </a:solidFill>
-                <a:latin typeface="Arial" panose="020B0604020202020204" pitchFamily="34" charset="0"/>
-                <a:cs typeface="Arial" panose="020B0604020202020204" pitchFamily="34" charset="0"/>
-              </a:rPr>
-              <a:t>Add more indicators and make the code do multiple stock analysis at the same time</a:t>
-            </a:r>
-          </a:p>
-          <a:p>
-            <a:endParaRPr lang="en-US" sz="2000" dirty="0">
+            <a:endParaRPr lang="en-US" sz="2400" dirty="0">
               <a:solidFill>
                 <a:schemeClr val="bg1">
                   <a:lumMod val="75000"/>
@@ -10010,7 +9743,25 @@
             </a:endParaRPr>
           </a:p>
           <a:p>
-            <a:endParaRPr lang="en-US" sz="2000" dirty="0">
+            <a:pPr marL="285750" indent="-285750">
+              <a:buFont typeface="Arial" panose="020B0604020202020204" pitchFamily="34" charset="0"/>
+              <a:buChar char="•"/>
+            </a:pPr>
+            <a:r>
+              <a:rPr lang="en-US" sz="2400" dirty="0">
+                <a:solidFill>
+                  <a:schemeClr val="bg1">
+                    <a:lumMod val="75000"/>
+                  </a:schemeClr>
+                </a:solidFill>
+                <a:latin typeface="Arial" panose="020B0604020202020204" pitchFamily="34" charset="0"/>
+                <a:cs typeface="Arial" panose="020B0604020202020204" pitchFamily="34" charset="0"/>
+              </a:rPr>
+              <a:t>Why did we make money or lose money?</a:t>
+            </a:r>
+          </a:p>
+          <a:p>
+            <a:endParaRPr lang="en-US" sz="1100" dirty="0">
               <a:solidFill>
                 <a:schemeClr val="bg1">
                   <a:lumMod val="85000"/>
@@ -10025,7 +9776,7 @@
     </p:spTree>
     <p:extLst>
       <p:ext uri="{BB962C8B-B14F-4D97-AF65-F5344CB8AC3E}">
-        <p14:creationId xmlns:p14="http://schemas.microsoft.com/office/powerpoint/2010/main" val="2524113624"/>
+        <p14:creationId xmlns:p14="http://schemas.microsoft.com/office/powerpoint/2010/main" val="817477383"/>
       </p:ext>
     </p:extLst>
   </p:cSld>
@@ -10648,6 +10399,530 @@
         <p:spPr>
           <a:xfrm>
             <a:off x="126205" y="541869"/>
+            <a:ext cx="5220941" cy="646331"/>
+          </a:xfrm>
+          <a:prstGeom prst="rect">
+            <a:avLst/>
+          </a:prstGeom>
+          <a:noFill/>
+        </p:spPr>
+        <p:txBody>
+          <a:bodyPr wrap="square">
+            <a:spAutoFit/>
+          </a:bodyPr>
+          <a:lstStyle/>
+          <a:p>
+            <a:pPr algn="r"/>
+            <a:r>
+              <a:rPr lang="en-US" sz="3600" dirty="0">
+                <a:solidFill>
+                  <a:schemeClr val="bg1"/>
+                </a:solidFill>
+                <a:latin typeface="Arial" panose="020B0604020202020204" pitchFamily="34" charset="0"/>
+                <a:cs typeface="Arial" panose="020B0604020202020204" pitchFamily="34" charset="0"/>
+              </a:rPr>
+              <a:t>Lessons Learned</a:t>
+            </a:r>
+          </a:p>
+        </p:txBody>
+      </p:sp>
+      <p:sp>
+        <p:nvSpPr>
+          <p:cNvPr id="6" name="TextBox 5">
+            <a:extLst>
+              <a:ext uri="{FF2B5EF4-FFF2-40B4-BE49-F238E27FC236}">
+                <a16:creationId xmlns:a16="http://schemas.microsoft.com/office/drawing/2014/main" id="{B31D4CA7-C4C5-98E5-6FA6-41CDEC2E70A7}"/>
+              </a:ext>
+            </a:extLst>
+          </p:cNvPr>
+          <p:cNvSpPr txBox="1"/>
+          <p:nvPr/>
+        </p:nvSpPr>
+        <p:spPr>
+          <a:xfrm>
+            <a:off x="7886700" y="112991"/>
+            <a:ext cx="4186239" cy="523220"/>
+          </a:xfrm>
+          <a:prstGeom prst="rect">
+            <a:avLst/>
+          </a:prstGeom>
+          <a:noFill/>
+        </p:spPr>
+        <p:txBody>
+          <a:bodyPr wrap="square" rtlCol="0">
+            <a:spAutoFit/>
+          </a:bodyPr>
+          <a:lstStyle/>
+          <a:p>
+            <a:pPr algn="r"/>
+            <a:r>
+              <a:rPr lang="en-US" sz="1400" i="1" dirty="0">
+                <a:solidFill>
+                  <a:schemeClr val="bg1">
+                    <a:lumMod val="75000"/>
+                  </a:schemeClr>
+                </a:solidFill>
+                <a:latin typeface="Arial" panose="020B0604020202020204" pitchFamily="34" charset="0"/>
+                <a:cs typeface="Arial" panose="020B0604020202020204" pitchFamily="34" charset="0"/>
+              </a:rPr>
+              <a:t>Briefer: Michael </a:t>
+            </a:r>
+            <a:r>
+              <a:rPr lang="en-US" sz="1400" i="1" dirty="0" err="1">
+                <a:solidFill>
+                  <a:schemeClr val="bg1">
+                    <a:lumMod val="75000"/>
+                  </a:schemeClr>
+                </a:solidFill>
+                <a:latin typeface="Arial" panose="020B0604020202020204" pitchFamily="34" charset="0"/>
+                <a:cs typeface="Arial" panose="020B0604020202020204" pitchFamily="34" charset="0"/>
+              </a:rPr>
+              <a:t>Drinkard</a:t>
+            </a:r>
+            <a:endParaRPr lang="en-US" sz="1400" i="1" dirty="0">
+              <a:solidFill>
+                <a:schemeClr val="bg1">
+                  <a:lumMod val="75000"/>
+                </a:schemeClr>
+              </a:solidFill>
+              <a:latin typeface="Arial" panose="020B0604020202020204" pitchFamily="34" charset="0"/>
+              <a:cs typeface="Arial" panose="020B0604020202020204" pitchFamily="34" charset="0"/>
+            </a:endParaRPr>
+          </a:p>
+          <a:p>
+            <a:pPr algn="r"/>
+            <a:endParaRPr lang="en-US" sz="1400" dirty="0">
+              <a:solidFill>
+                <a:schemeClr val="bg1"/>
+              </a:solidFill>
+              <a:latin typeface="Arial" panose="020B0604020202020204" pitchFamily="34" charset="0"/>
+              <a:cs typeface="Arial" panose="020B0604020202020204" pitchFamily="34" charset="0"/>
+            </a:endParaRPr>
+          </a:p>
+        </p:txBody>
+      </p:sp>
+      <p:sp>
+        <p:nvSpPr>
+          <p:cNvPr id="10" name="TextBox 9">
+            <a:extLst>
+              <a:ext uri="{FF2B5EF4-FFF2-40B4-BE49-F238E27FC236}">
+                <a16:creationId xmlns:a16="http://schemas.microsoft.com/office/drawing/2014/main" id="{BD950A60-DECC-F2E1-1C7F-BB10521448F5}"/>
+              </a:ext>
+            </a:extLst>
+          </p:cNvPr>
+          <p:cNvSpPr txBox="1"/>
+          <p:nvPr/>
+        </p:nvSpPr>
+        <p:spPr>
+          <a:xfrm>
+            <a:off x="870347" y="2150566"/>
+            <a:ext cx="11321654" cy="3477875"/>
+          </a:xfrm>
+          <a:prstGeom prst="rect">
+            <a:avLst/>
+          </a:prstGeom>
+          <a:noFill/>
+        </p:spPr>
+        <p:txBody>
+          <a:bodyPr wrap="square" rtlCol="0">
+            <a:spAutoFit/>
+          </a:bodyPr>
+          <a:lstStyle/>
+          <a:p>
+            <a:r>
+              <a:rPr lang="en-US" sz="2000" b="1" i="1" dirty="0">
+                <a:solidFill>
+                  <a:schemeClr val="bg1">
+                    <a:lumMod val="75000"/>
+                  </a:schemeClr>
+                </a:solidFill>
+                <a:latin typeface="Arial" panose="020B0604020202020204" pitchFamily="34" charset="0"/>
+                <a:cs typeface="Arial" panose="020B0604020202020204" pitchFamily="34" charset="0"/>
+              </a:rPr>
+              <a:t>What we did well:  </a:t>
+            </a:r>
+          </a:p>
+          <a:p>
+            <a:endParaRPr lang="en-US" sz="2000" dirty="0">
+              <a:solidFill>
+                <a:schemeClr val="bg1">
+                  <a:lumMod val="75000"/>
+                </a:schemeClr>
+              </a:solidFill>
+              <a:latin typeface="Arial" panose="020B0604020202020204" pitchFamily="34" charset="0"/>
+              <a:cs typeface="Arial" panose="020B0604020202020204" pitchFamily="34" charset="0"/>
+            </a:endParaRPr>
+          </a:p>
+          <a:p>
+            <a:pPr marL="742950" lvl="1" indent="-285750">
+              <a:buFont typeface="Arial" panose="020B0604020202020204" pitchFamily="34" charset="0"/>
+              <a:buChar char="•"/>
+            </a:pPr>
+            <a:r>
+              <a:rPr lang="en-US" sz="2000" dirty="0">
+                <a:solidFill>
+                  <a:schemeClr val="bg1">
+                    <a:lumMod val="75000"/>
+                  </a:schemeClr>
+                </a:solidFill>
+                <a:latin typeface="Arial" panose="020B0604020202020204" pitchFamily="34" charset="0"/>
+                <a:cs typeface="Arial" panose="020B0604020202020204" pitchFamily="34" charset="0"/>
+              </a:rPr>
+              <a:t>We successfully created a signal that tells the computer to buy or sell</a:t>
+            </a:r>
+          </a:p>
+          <a:p>
+            <a:endParaRPr lang="en-US" sz="2000" dirty="0">
+              <a:solidFill>
+                <a:schemeClr val="bg1">
+                  <a:lumMod val="75000"/>
+                </a:schemeClr>
+              </a:solidFill>
+              <a:latin typeface="Arial" panose="020B0604020202020204" pitchFamily="34" charset="0"/>
+              <a:cs typeface="Arial" panose="020B0604020202020204" pitchFamily="34" charset="0"/>
+            </a:endParaRPr>
+          </a:p>
+          <a:p>
+            <a:endParaRPr lang="en-US" sz="2000" dirty="0">
+              <a:solidFill>
+                <a:schemeClr val="bg1">
+                  <a:lumMod val="75000"/>
+                </a:schemeClr>
+              </a:solidFill>
+              <a:latin typeface="Arial" panose="020B0604020202020204" pitchFamily="34" charset="0"/>
+              <a:cs typeface="Arial" panose="020B0604020202020204" pitchFamily="34" charset="0"/>
+            </a:endParaRPr>
+          </a:p>
+          <a:p>
+            <a:endParaRPr lang="en-US" sz="2000" b="1" i="1" dirty="0">
+              <a:solidFill>
+                <a:schemeClr val="bg1">
+                  <a:lumMod val="75000"/>
+                </a:schemeClr>
+              </a:solidFill>
+              <a:latin typeface="Arial" panose="020B0604020202020204" pitchFamily="34" charset="0"/>
+              <a:cs typeface="Arial" panose="020B0604020202020204" pitchFamily="34" charset="0"/>
+            </a:endParaRPr>
+          </a:p>
+          <a:p>
+            <a:r>
+              <a:rPr lang="en-US" sz="2000" b="1" i="1" dirty="0">
+                <a:solidFill>
+                  <a:schemeClr val="bg1">
+                    <a:lumMod val="75000"/>
+                  </a:schemeClr>
+                </a:solidFill>
+                <a:latin typeface="Arial" panose="020B0604020202020204" pitchFamily="34" charset="0"/>
+                <a:cs typeface="Arial" panose="020B0604020202020204" pitchFamily="34" charset="0"/>
+              </a:rPr>
+              <a:t>What we can do better:</a:t>
+            </a:r>
+          </a:p>
+          <a:p>
+            <a:pPr marL="742950" lvl="1" indent="-285750">
+              <a:buFont typeface="Arial" panose="020B0604020202020204" pitchFamily="34" charset="0"/>
+              <a:buChar char="•"/>
+            </a:pPr>
+            <a:endParaRPr lang="en-US" sz="2000" dirty="0">
+              <a:solidFill>
+                <a:schemeClr val="bg1">
+                  <a:lumMod val="75000"/>
+                </a:schemeClr>
+              </a:solidFill>
+              <a:latin typeface="Arial" panose="020B0604020202020204" pitchFamily="34" charset="0"/>
+              <a:cs typeface="Arial" panose="020B0604020202020204" pitchFamily="34" charset="0"/>
+            </a:endParaRPr>
+          </a:p>
+          <a:p>
+            <a:pPr marL="742950" lvl="1" indent="-285750">
+              <a:buFont typeface="Arial" panose="020B0604020202020204" pitchFamily="34" charset="0"/>
+              <a:buChar char="•"/>
+            </a:pPr>
+            <a:r>
+              <a:rPr lang="en-US" sz="2000" dirty="0">
+                <a:solidFill>
+                  <a:schemeClr val="bg1">
+                    <a:lumMod val="75000"/>
+                  </a:schemeClr>
+                </a:solidFill>
+                <a:latin typeface="Arial" panose="020B0604020202020204" pitchFamily="34" charset="0"/>
+                <a:cs typeface="Arial" panose="020B0604020202020204" pitchFamily="34" charset="0"/>
+              </a:rPr>
+              <a:t>Add more indicators and make the code do multiple stock analysis at the same time</a:t>
+            </a:r>
+          </a:p>
+          <a:p>
+            <a:endParaRPr lang="en-US" sz="2000" dirty="0">
+              <a:solidFill>
+                <a:schemeClr val="bg1">
+                  <a:lumMod val="75000"/>
+                </a:schemeClr>
+              </a:solidFill>
+              <a:latin typeface="Arial" panose="020B0604020202020204" pitchFamily="34" charset="0"/>
+              <a:cs typeface="Arial" panose="020B0604020202020204" pitchFamily="34" charset="0"/>
+            </a:endParaRPr>
+          </a:p>
+          <a:p>
+            <a:endParaRPr lang="en-US" sz="2000" dirty="0">
+              <a:solidFill>
+                <a:schemeClr val="bg1">
+                  <a:lumMod val="85000"/>
+                </a:schemeClr>
+              </a:solidFill>
+              <a:latin typeface="Arial" panose="020B0604020202020204" pitchFamily="34" charset="0"/>
+              <a:cs typeface="Arial" panose="020B0604020202020204" pitchFamily="34" charset="0"/>
+            </a:endParaRPr>
+          </a:p>
+        </p:txBody>
+      </p:sp>
+    </p:spTree>
+    <p:extLst>
+      <p:ext uri="{BB962C8B-B14F-4D97-AF65-F5344CB8AC3E}">
+        <p14:creationId xmlns:p14="http://schemas.microsoft.com/office/powerpoint/2010/main" val="2524113624"/>
+      </p:ext>
+    </p:extLst>
+  </p:cSld>
+  <p:clrMapOvr>
+    <a:masterClrMapping/>
+  </p:clrMapOvr>
+</p:sld>
+</file>
+
+<file path=ppt/slides/slide21.xml><?xml version="1.0" encoding="utf-8"?>
+<p:sld xmlns:a="http://schemas.openxmlformats.org/drawingml/2006/main" xmlns:r="http://schemas.openxmlformats.org/officeDocument/2006/relationships" xmlns:p="http://schemas.openxmlformats.org/presentationml/2006/main">
+  <p:cSld>
+    <p:spTree>
+      <p:nvGrpSpPr>
+        <p:cNvPr id="1" name=""/>
+        <p:cNvGrpSpPr/>
+        <p:nvPr/>
+      </p:nvGrpSpPr>
+      <p:grpSpPr>
+        <a:xfrm>
+          <a:off x="0" y="0"/>
+          <a:ext cx="0" cy="0"/>
+          <a:chOff x="0" y="0"/>
+          <a:chExt cx="0" cy="0"/>
+        </a:xfrm>
+      </p:grpSpPr>
+      <p:sp>
+        <p:nvSpPr>
+          <p:cNvPr id="2" name="Title 1">
+            <a:extLst>
+              <a:ext uri="{FF2B5EF4-FFF2-40B4-BE49-F238E27FC236}">
+                <a16:creationId xmlns:a16="http://schemas.microsoft.com/office/drawing/2014/main" id="{2C01C7FB-7974-6495-C221-8D11C0475C24}"/>
+              </a:ext>
+            </a:extLst>
+          </p:cNvPr>
+          <p:cNvSpPr>
+            <a:spLocks noGrp="1"/>
+          </p:cNvSpPr>
+          <p:nvPr>
+            <p:ph type="title"/>
+          </p:nvPr>
+        </p:nvSpPr>
+        <p:spPr/>
+        <p:txBody>
+          <a:bodyPr/>
+          <a:lstStyle/>
+          <a:p>
+            <a:endParaRPr lang="en-US"/>
+          </a:p>
+        </p:txBody>
+      </p:sp>
+      <p:sp>
+        <p:nvSpPr>
+          <p:cNvPr id="3" name="Content Placeholder 2">
+            <a:extLst>
+              <a:ext uri="{FF2B5EF4-FFF2-40B4-BE49-F238E27FC236}">
+                <a16:creationId xmlns:a16="http://schemas.microsoft.com/office/drawing/2014/main" id="{4733FF64-B905-CF6F-BFC1-107D49805FEA}"/>
+              </a:ext>
+            </a:extLst>
+          </p:cNvPr>
+          <p:cNvSpPr>
+            <a:spLocks noGrp="1"/>
+          </p:cNvSpPr>
+          <p:nvPr>
+            <p:ph idx="1"/>
+          </p:nvPr>
+        </p:nvSpPr>
+        <p:spPr/>
+        <p:txBody>
+          <a:bodyPr/>
+          <a:lstStyle/>
+          <a:p>
+            <a:endParaRPr lang="en-US"/>
+          </a:p>
+        </p:txBody>
+      </p:sp>
+      <p:sp>
+        <p:nvSpPr>
+          <p:cNvPr id="4" name="Rectangle 3">
+            <a:extLst>
+              <a:ext uri="{FF2B5EF4-FFF2-40B4-BE49-F238E27FC236}">
+                <a16:creationId xmlns:a16="http://schemas.microsoft.com/office/drawing/2014/main" id="{1D65FFF8-FDBD-9E73-6E91-C79F67CA9122}"/>
+              </a:ext>
+            </a:extLst>
+          </p:cNvPr>
+          <p:cNvSpPr/>
+          <p:nvPr/>
+        </p:nvSpPr>
+        <p:spPr>
+          <a:xfrm>
+            <a:off x="0" y="0"/>
+            <a:ext cx="12192000" cy="6858000"/>
+          </a:xfrm>
+          <a:prstGeom prst="rect">
+            <a:avLst/>
+          </a:prstGeom>
+          <a:solidFill>
+            <a:schemeClr val="tx1"/>
+          </a:solidFill>
+          <a:ln>
+            <a:noFill/>
+          </a:ln>
+        </p:spPr>
+        <p:style>
+          <a:lnRef idx="2">
+            <a:schemeClr val="accent1">
+              <a:shade val="15000"/>
+            </a:schemeClr>
+          </a:lnRef>
+          <a:fillRef idx="1">
+            <a:schemeClr val="accent1"/>
+          </a:fillRef>
+          <a:effectRef idx="0">
+            <a:schemeClr val="accent1"/>
+          </a:effectRef>
+          <a:fontRef idx="minor">
+            <a:schemeClr val="lt1"/>
+          </a:fontRef>
+        </p:style>
+        <p:txBody>
+          <a:bodyPr rtlCol="0" anchor="ctr"/>
+          <a:lstStyle/>
+          <a:p>
+            <a:pPr algn="ctr"/>
+            <a:endParaRPr lang="en-US"/>
+          </a:p>
+        </p:txBody>
+      </p:sp>
+      <p:sp>
+        <p:nvSpPr>
+          <p:cNvPr id="5" name="Rectangle 4">
+            <a:extLst>
+              <a:ext uri="{FF2B5EF4-FFF2-40B4-BE49-F238E27FC236}">
+                <a16:creationId xmlns:a16="http://schemas.microsoft.com/office/drawing/2014/main" id="{03EBA741-66CB-37F4-E061-7AF35B5FC633}"/>
+              </a:ext>
+            </a:extLst>
+          </p:cNvPr>
+          <p:cNvSpPr/>
+          <p:nvPr/>
+        </p:nvSpPr>
+        <p:spPr>
+          <a:xfrm>
+            <a:off x="114300" y="128587"/>
+            <a:ext cx="11958638" cy="6600825"/>
+          </a:xfrm>
+          <a:prstGeom prst="rect">
+            <a:avLst/>
+          </a:prstGeom>
+          <a:solidFill>
+            <a:schemeClr val="tx1"/>
+          </a:solidFill>
+          <a:ln w="12700">
+            <a:solidFill>
+              <a:schemeClr val="accent2">
+                <a:lumMod val="75000"/>
+              </a:schemeClr>
+            </a:solidFill>
+          </a:ln>
+        </p:spPr>
+        <p:style>
+          <a:lnRef idx="2">
+            <a:schemeClr val="accent1">
+              <a:shade val="15000"/>
+            </a:schemeClr>
+          </a:lnRef>
+          <a:fillRef idx="1">
+            <a:schemeClr val="accent1"/>
+          </a:fillRef>
+          <a:effectRef idx="0">
+            <a:schemeClr val="accent1"/>
+          </a:effectRef>
+          <a:fontRef idx="minor">
+            <a:schemeClr val="lt1"/>
+          </a:fontRef>
+        </p:style>
+        <p:txBody>
+          <a:bodyPr rtlCol="0" anchor="ctr"/>
+          <a:lstStyle/>
+          <a:p>
+            <a:pPr algn="ctr"/>
+            <a:endParaRPr lang="en-US"/>
+          </a:p>
+        </p:txBody>
+      </p:sp>
+      <p:cxnSp>
+        <p:nvCxnSpPr>
+          <p:cNvPr id="9" name="Straight Connector 8">
+            <a:extLst>
+              <a:ext uri="{FF2B5EF4-FFF2-40B4-BE49-F238E27FC236}">
+                <a16:creationId xmlns:a16="http://schemas.microsoft.com/office/drawing/2014/main" id="{1AC673B1-26F6-4416-3E21-C88A8DB70859}"/>
+              </a:ext>
+            </a:extLst>
+          </p:cNvPr>
+          <p:cNvCxnSpPr>
+            <a:cxnSpLocks/>
+          </p:cNvCxnSpPr>
+          <p:nvPr/>
+        </p:nvCxnSpPr>
+        <p:spPr>
+          <a:xfrm>
+            <a:off x="126206" y="1285868"/>
+            <a:ext cx="5220940" cy="11802"/>
+          </a:xfrm>
+          <a:prstGeom prst="line">
+            <a:avLst/>
+          </a:prstGeom>
+          <a:ln w="12700">
+            <a:solidFill>
+              <a:schemeClr val="accent2">
+                <a:lumMod val="75000"/>
+              </a:schemeClr>
+            </a:solidFill>
+          </a:ln>
+        </p:spPr>
+        <p:style>
+          <a:lnRef idx="1">
+            <a:schemeClr val="accent1"/>
+          </a:lnRef>
+          <a:fillRef idx="0">
+            <a:schemeClr val="accent1"/>
+          </a:fillRef>
+          <a:effectRef idx="0">
+            <a:schemeClr val="accent1"/>
+          </a:effectRef>
+          <a:fontRef idx="minor">
+            <a:schemeClr val="tx1"/>
+          </a:fontRef>
+        </p:style>
+      </p:cxnSp>
+      <p:sp>
+        <p:nvSpPr>
+          <p:cNvPr id="11" name="TextBox 10">
+            <a:extLst>
+              <a:ext uri="{FF2B5EF4-FFF2-40B4-BE49-F238E27FC236}">
+                <a16:creationId xmlns:a16="http://schemas.microsoft.com/office/drawing/2014/main" id="{7196FC43-75B8-DCA5-B6C2-A2B4E1C6188B}"/>
+              </a:ext>
+            </a:extLst>
+          </p:cNvPr>
+          <p:cNvSpPr txBox="1"/>
+          <p:nvPr/>
+        </p:nvSpPr>
+        <p:spPr>
+          <a:xfrm>
+            <a:off x="126205" y="541869"/>
             <a:ext cx="5220941" cy="707886"/>
           </a:xfrm>
           <a:prstGeom prst="rect">
@@ -10853,7 +11128,7 @@
 </p:sld>
 </file>
 
-<file path=ppt/slides/slide21.xml><?xml version="1.0" encoding="utf-8"?>
+<file path=ppt/slides/slide22.xml><?xml version="1.0" encoding="utf-8"?>
 <p:sld xmlns:a="http://schemas.openxmlformats.org/drawingml/2006/main" xmlns:r="http://schemas.openxmlformats.org/officeDocument/2006/relationships" xmlns:p="http://schemas.openxmlformats.org/presentationml/2006/main">
   <p:cSld>
     <p:spTree>

</xml_diff>

<commit_message>
adding updated version of tonight's slides - I made one change in slide order for the exec summary
</commit_message>
<xml_diff>
--- a/MACD_Indicators_Group_2.pptx
+++ b/MACD_Indicators_Group_2.pptx
@@ -10,8 +10,8 @@
   <p:sldIdLst>
     <p:sldId id="256" r:id="rId2"/>
     <p:sldId id="257" r:id="rId3"/>
-    <p:sldId id="258" r:id="rId4"/>
-    <p:sldId id="259" r:id="rId5"/>
+    <p:sldId id="259" r:id="rId4"/>
+    <p:sldId id="258" r:id="rId5"/>
     <p:sldId id="268" r:id="rId6"/>
     <p:sldId id="275" r:id="rId7"/>
     <p:sldId id="261" r:id="rId8"/>
@@ -529,6 +529,28 @@
           <a:bodyPr/>
           <a:lstStyle/>
           <a:p>
+            <a:pPr marL="285750" indent="-285750">
+              <a:buFont typeface="Arial" panose="020B0604020202020204" pitchFamily="34" charset="0"/>
+              <a:buChar char="•"/>
+            </a:pPr>
+            <a:br>
+              <a:rPr lang="en-US" dirty="0">
+                <a:solidFill>
+                  <a:schemeClr val="bg1">
+                    <a:lumMod val="75000"/>
+                  </a:schemeClr>
+                </a:solidFill>
+              </a:rPr>
+            </a:br>
+            <a:endParaRPr lang="en-US" dirty="0">
+              <a:solidFill>
+                <a:schemeClr val="bg1">
+                  <a:lumMod val="75000"/>
+                </a:schemeClr>
+              </a:solidFill>
+            </a:endParaRPr>
+          </a:p>
+          <a:p>
             <a:endParaRPr lang="en-US" dirty="0"/>
           </a:p>
         </p:txBody>
@@ -559,7 +581,7 @@
     </p:spTree>
     <p:extLst>
       <p:ext uri="{BB962C8B-B14F-4D97-AF65-F5344CB8AC3E}">
-        <p14:creationId xmlns:p14="http://schemas.microsoft.com/office/powerpoint/2010/main" val="2569627304"/>
+        <p14:creationId xmlns:p14="http://schemas.microsoft.com/office/powerpoint/2010/main" val="3074608467"/>
       </p:ext>
     </p:extLst>
   </p:cSld>
@@ -613,28 +635,6 @@
           <a:bodyPr/>
           <a:lstStyle/>
           <a:p>
-            <a:pPr marL="285750" indent="-285750">
-              <a:buFont typeface="Arial" panose="020B0604020202020204" pitchFamily="34" charset="0"/>
-              <a:buChar char="•"/>
-            </a:pPr>
-            <a:br>
-              <a:rPr lang="en-US" dirty="0">
-                <a:solidFill>
-                  <a:schemeClr val="bg1">
-                    <a:lumMod val="75000"/>
-                  </a:schemeClr>
-                </a:solidFill>
-              </a:rPr>
-            </a:br>
-            <a:endParaRPr lang="en-US" dirty="0">
-              <a:solidFill>
-                <a:schemeClr val="bg1">
-                  <a:lumMod val="75000"/>
-                </a:schemeClr>
-              </a:solidFill>
-            </a:endParaRPr>
-          </a:p>
-          <a:p>
             <a:endParaRPr lang="en-US" dirty="0"/>
           </a:p>
         </p:txBody>
@@ -665,7 +665,7 @@
     </p:spTree>
     <p:extLst>
       <p:ext uri="{BB962C8B-B14F-4D97-AF65-F5344CB8AC3E}">
-        <p14:creationId xmlns:p14="http://schemas.microsoft.com/office/powerpoint/2010/main" val="3074608467"/>
+        <p14:creationId xmlns:p14="http://schemas.microsoft.com/office/powerpoint/2010/main" val="2569627304"/>
       </p:ext>
     </p:extLst>
   </p:cSld>
@@ -11615,17 +11615,173 @@
                 <a:latin typeface="Arial" panose="020B0604020202020204" pitchFamily="34" charset="0"/>
                 <a:cs typeface="Arial" panose="020B0604020202020204" pitchFamily="34" charset="0"/>
               </a:rPr>
-              <a:t>Terms Defined</a:t>
-            </a:r>
-          </a:p>
-        </p:txBody>
-      </p:sp>
-      <p:sp>
-        <p:nvSpPr>
-          <p:cNvPr id="13" name="TextBox 12">
-            <a:extLst>
-              <a:ext uri="{FF2B5EF4-FFF2-40B4-BE49-F238E27FC236}">
-                <a16:creationId xmlns:a16="http://schemas.microsoft.com/office/drawing/2014/main" id="{C6953872-7153-48AC-A7C8-56CD5742EB34}"/>
+              <a:t>Frame the Problem</a:t>
+            </a:r>
+          </a:p>
+        </p:txBody>
+      </p:sp>
+      <p:sp>
+        <p:nvSpPr>
+          <p:cNvPr id="8" name="TextBox 7">
+            <a:extLst>
+              <a:ext uri="{FF2B5EF4-FFF2-40B4-BE49-F238E27FC236}">
+                <a16:creationId xmlns:a16="http://schemas.microsoft.com/office/drawing/2014/main" id="{A52CF821-9288-CE2D-732A-450345E1ED3B}"/>
+              </a:ext>
+            </a:extLst>
+          </p:cNvPr>
+          <p:cNvSpPr txBox="1"/>
+          <p:nvPr/>
+        </p:nvSpPr>
+        <p:spPr>
+          <a:xfrm>
+            <a:off x="2819397" y="2213313"/>
+            <a:ext cx="6924676" cy="2862322"/>
+          </a:xfrm>
+          <a:prstGeom prst="rect">
+            <a:avLst/>
+          </a:prstGeom>
+          <a:noFill/>
+        </p:spPr>
+        <p:txBody>
+          <a:bodyPr wrap="square">
+            <a:spAutoFit/>
+          </a:bodyPr>
+          <a:lstStyle/>
+          <a:p>
+            <a:pPr marL="285750" indent="-285750">
+              <a:buFont typeface="Arial" panose="020B0604020202020204" pitchFamily="34" charset="0"/>
+              <a:buChar char="•"/>
+            </a:pPr>
+            <a:r>
+              <a:rPr lang="en-US" b="0" i="0" dirty="0">
+                <a:solidFill>
+                  <a:schemeClr val="bg1">
+                    <a:lumMod val="75000"/>
+                  </a:schemeClr>
+                </a:solidFill>
+                <a:effectLst/>
+                <a:latin typeface="Arial" panose="020B0604020202020204" pitchFamily="34" charset="0"/>
+                <a:cs typeface="Arial" panose="020B0604020202020204" pitchFamily="34" charset="0"/>
+              </a:rPr>
+              <a:t>Our project aims at establishing security trading recommendations depending on moving average convergence and divergence, using exponential moving averages of closing prices of time series data frame.</a:t>
+            </a:r>
+          </a:p>
+          <a:p>
+            <a:endParaRPr lang="en-US" b="0" i="0" dirty="0">
+              <a:solidFill>
+                <a:schemeClr val="bg1">
+                  <a:lumMod val="75000"/>
+                </a:schemeClr>
+              </a:solidFill>
+              <a:effectLst/>
+              <a:latin typeface="Arial" panose="020B0604020202020204" pitchFamily="34" charset="0"/>
+              <a:cs typeface="Arial" panose="020B0604020202020204" pitchFamily="34" charset="0"/>
+            </a:endParaRPr>
+          </a:p>
+          <a:p>
+            <a:pPr marL="285750" indent="-285750">
+              <a:buFont typeface="Arial" panose="020B0604020202020204" pitchFamily="34" charset="0"/>
+              <a:buChar char="•"/>
+            </a:pPr>
+            <a:r>
+              <a:rPr lang="en-US" b="0" i="0" dirty="0">
+                <a:solidFill>
+                  <a:schemeClr val="bg1">
+                    <a:lumMod val="75000"/>
+                  </a:schemeClr>
+                </a:solidFill>
+                <a:effectLst/>
+                <a:latin typeface="Arial" panose="020B0604020202020204" pitchFamily="34" charset="0"/>
+                <a:cs typeface="Arial" panose="020B0604020202020204" pitchFamily="34" charset="0"/>
+              </a:rPr>
+              <a:t>The “MACD</a:t>
+            </a:r>
+            <a:r>
+              <a:rPr lang="en-US" dirty="0">
+                <a:solidFill>
+                  <a:schemeClr val="bg1">
+                    <a:lumMod val="75000"/>
+                  </a:schemeClr>
+                </a:solidFill>
+                <a:latin typeface="Arial" panose="020B0604020202020204" pitchFamily="34" charset="0"/>
+                <a:cs typeface="Arial" panose="020B0604020202020204" pitchFamily="34" charset="0"/>
+              </a:rPr>
+              <a:t>”</a:t>
+            </a:r>
+            <a:r>
+              <a:rPr lang="en-US" b="0" i="0" dirty="0">
+                <a:solidFill>
+                  <a:schemeClr val="bg1">
+                    <a:lumMod val="75000"/>
+                  </a:schemeClr>
+                </a:solidFill>
+                <a:effectLst/>
+                <a:latin typeface="Arial" panose="020B0604020202020204" pitchFamily="34" charset="0"/>
+                <a:cs typeface="Arial" panose="020B0604020202020204" pitchFamily="34" charset="0"/>
+              </a:rPr>
+              <a:t> is a popular technical indicator used in trading and investing to identify potential  trend reversals, generate buy or sell signals, and  assess the overall momentum of an asset.</a:t>
+            </a:r>
+            <a:endParaRPr lang="en-US" dirty="0">
+              <a:solidFill>
+                <a:schemeClr val="bg1">
+                  <a:lumMod val="75000"/>
+                </a:schemeClr>
+              </a:solidFill>
+              <a:latin typeface="Arial" panose="020B0604020202020204" pitchFamily="34" charset="0"/>
+              <a:cs typeface="Arial" panose="020B0604020202020204" pitchFamily="34" charset="0"/>
+            </a:endParaRPr>
+          </a:p>
+          <a:p>
+            <a:r>
+              <a:rPr lang="en-US" dirty="0">
+                <a:solidFill>
+                  <a:schemeClr val="bg1">
+                    <a:lumMod val="75000"/>
+                  </a:schemeClr>
+                </a:solidFill>
+                <a:latin typeface="Arial" panose="020B0604020202020204" pitchFamily="34" charset="0"/>
+                <a:cs typeface="Arial" panose="020B0604020202020204" pitchFamily="34" charset="0"/>
+              </a:rPr>
+              <a:t>     </a:t>
+            </a:r>
+            <a:r>
+              <a:rPr lang="en-US" b="0" dirty="0">
+                <a:solidFill>
+                  <a:schemeClr val="bg1">
+                    <a:lumMod val="75000"/>
+                  </a:schemeClr>
+                </a:solidFill>
+                <a:effectLst/>
+                <a:latin typeface="Arial" panose="020B0604020202020204" pitchFamily="34" charset="0"/>
+                <a:cs typeface="Arial" panose="020B0604020202020204" pitchFamily="34" charset="0"/>
+              </a:rPr>
+              <a:t>It  consists of two lines: the MACD line and the signal line.</a:t>
+            </a:r>
+            <a:br>
+              <a:rPr lang="en-US" dirty="0">
+                <a:solidFill>
+                  <a:schemeClr val="bg1">
+                    <a:lumMod val="75000"/>
+                  </a:schemeClr>
+                </a:solidFill>
+              </a:rPr>
+            </a:br>
+            <a:endParaRPr lang="en-US" dirty="0">
+              <a:solidFill>
+                <a:schemeClr val="bg1">
+                  <a:lumMod val="75000"/>
+                </a:schemeClr>
+              </a:solidFill>
+            </a:endParaRPr>
+          </a:p>
+        </p:txBody>
+      </p:sp>
+      <p:sp>
+        <p:nvSpPr>
+          <p:cNvPr id="10" name="TextBox 9">
+            <a:extLst>
+              <a:ext uri="{FF2B5EF4-FFF2-40B4-BE49-F238E27FC236}">
+                <a16:creationId xmlns:a16="http://schemas.microsoft.com/office/drawing/2014/main" id="{991DB775-62CE-BC9F-AD32-1DEE38E317B0}"/>
               </a:ext>
             </a:extLst>
           </p:cNvPr>
@@ -11674,275 +11830,10 @@
           </a:p>
         </p:txBody>
       </p:sp>
-      <p:sp>
-        <p:nvSpPr>
-          <p:cNvPr id="7" name="TextBox 6">
-            <a:extLst>
-              <a:ext uri="{FF2B5EF4-FFF2-40B4-BE49-F238E27FC236}">
-                <a16:creationId xmlns:a16="http://schemas.microsoft.com/office/drawing/2014/main" id="{C4DAEBEA-FD9A-DB8D-F134-7A2EA15C144B}"/>
-              </a:ext>
-            </a:extLst>
-          </p:cNvPr>
-          <p:cNvSpPr txBox="1"/>
-          <p:nvPr/>
-        </p:nvSpPr>
-        <p:spPr>
-          <a:xfrm>
-            <a:off x="838200" y="1967021"/>
-            <a:ext cx="10945368" cy="4031873"/>
-          </a:xfrm>
-          <a:prstGeom prst="rect">
-            <a:avLst/>
-          </a:prstGeom>
-          <a:noFill/>
-        </p:spPr>
-        <p:txBody>
-          <a:bodyPr wrap="square">
-            <a:spAutoFit/>
-          </a:bodyPr>
-          <a:lstStyle/>
-          <a:p>
-            <a:r>
-              <a:rPr lang="en-US" sz="1600" b="1" i="0" dirty="0">
-                <a:solidFill>
-                  <a:srgbClr val="00B0F0"/>
-                </a:solidFill>
-                <a:effectLst/>
-                <a:latin typeface="Arial" panose="020B0604020202020204" pitchFamily="34" charset="0"/>
-                <a:cs typeface="Arial" panose="020B0604020202020204" pitchFamily="34" charset="0"/>
-              </a:rPr>
-              <a:t>Moving Average Convergence and Divergence (MACD):  </a:t>
-            </a:r>
-            <a:r>
-              <a:rPr lang="en-US" sz="1600" b="0" i="0" dirty="0">
-                <a:solidFill>
-                  <a:schemeClr val="bg1">
-                    <a:lumMod val="75000"/>
-                  </a:schemeClr>
-                </a:solidFill>
-                <a:effectLst/>
-                <a:latin typeface="Roboto" panose="02000000000000000000" pitchFamily="2" charset="0"/>
-              </a:rPr>
-              <a:t>a trend-following momentum indicator that shows the relationship between two exponential moving averages (EMAs) of a security's price</a:t>
-            </a:r>
-          </a:p>
-          <a:p>
-            <a:endParaRPr lang="en-US" sz="1600" dirty="0">
-              <a:solidFill>
-                <a:schemeClr val="bg1">
-                  <a:lumMod val="75000"/>
-                </a:schemeClr>
-              </a:solidFill>
-              <a:latin typeface="Roboto" panose="02000000000000000000" pitchFamily="2" charset="0"/>
-            </a:endParaRPr>
-          </a:p>
-          <a:p>
-            <a:endParaRPr lang="en-US" sz="1600" dirty="0">
-              <a:solidFill>
-                <a:srgbClr val="00B0F0"/>
-              </a:solidFill>
-              <a:latin typeface="Arial" panose="020B0604020202020204" pitchFamily="34" charset="0"/>
-              <a:cs typeface="Arial" panose="020B0604020202020204" pitchFamily="34" charset="0"/>
-            </a:endParaRPr>
-          </a:p>
-          <a:p>
-            <a:r>
-              <a:rPr lang="en-US" sz="1600" b="1" dirty="0">
-                <a:solidFill>
-                  <a:srgbClr val="00B0F0"/>
-                </a:solidFill>
-                <a:latin typeface="Arial" panose="020B0604020202020204" pitchFamily="34" charset="0"/>
-                <a:cs typeface="Arial" panose="020B0604020202020204" pitchFamily="34" charset="0"/>
-              </a:rPr>
-              <a:t>Exponentially Weighted Moving Average (EWMA):  </a:t>
-            </a:r>
-            <a:r>
-              <a:rPr lang="en-US" sz="1600" dirty="0">
-                <a:solidFill>
-                  <a:schemeClr val="bg1">
-                    <a:lumMod val="75000"/>
-                  </a:schemeClr>
-                </a:solidFill>
-                <a:latin typeface="Arial" panose="020B0604020202020204" pitchFamily="34" charset="0"/>
-                <a:cs typeface="Arial" panose="020B0604020202020204" pitchFamily="34" charset="0"/>
-              </a:rPr>
-              <a:t>quantitative/statistical measure used to model a time series</a:t>
-            </a:r>
-            <a:endParaRPr lang="en-US" sz="1600" b="0" i="0" dirty="0">
-              <a:solidFill>
-                <a:srgbClr val="636E72"/>
-              </a:solidFill>
-              <a:effectLst/>
-              <a:latin typeface="Inter"/>
-            </a:endParaRPr>
-          </a:p>
-          <a:p>
-            <a:endParaRPr lang="en-US" sz="1600" dirty="0">
-              <a:solidFill>
-                <a:schemeClr val="bg1">
-                  <a:lumMod val="75000"/>
-                </a:schemeClr>
-              </a:solidFill>
-              <a:latin typeface="Arial" panose="020B0604020202020204" pitchFamily="34" charset="0"/>
-              <a:cs typeface="Arial" panose="020B0604020202020204" pitchFamily="34" charset="0"/>
-            </a:endParaRPr>
-          </a:p>
-          <a:p>
-            <a:endParaRPr lang="en-US" sz="1600" b="1" dirty="0">
-              <a:solidFill>
-                <a:schemeClr val="bg1">
-                  <a:lumMod val="75000"/>
-                </a:schemeClr>
-              </a:solidFill>
-              <a:latin typeface="Arial" panose="020B0604020202020204" pitchFamily="34" charset="0"/>
-              <a:cs typeface="Arial" panose="020B0604020202020204" pitchFamily="34" charset="0"/>
-            </a:endParaRPr>
-          </a:p>
-          <a:p>
-            <a:r>
-              <a:rPr lang="en-US" sz="1600" b="1" dirty="0">
-                <a:solidFill>
-                  <a:srgbClr val="00B0F0"/>
-                </a:solidFill>
-                <a:latin typeface="Arial" panose="020B0604020202020204" pitchFamily="34" charset="0"/>
-                <a:cs typeface="Arial" panose="020B0604020202020204" pitchFamily="34" charset="0"/>
-              </a:rPr>
-              <a:t>Signal line:  </a:t>
-            </a:r>
-            <a:r>
-              <a:rPr lang="en-US" sz="1600" dirty="0">
-                <a:solidFill>
-                  <a:schemeClr val="bg1">
-                    <a:lumMod val="75000"/>
-                  </a:schemeClr>
-                </a:solidFill>
-                <a:latin typeface="Arial" panose="020B0604020202020204" pitchFamily="34" charset="0"/>
-                <a:cs typeface="Arial" panose="020B0604020202020204" pitchFamily="34" charset="0"/>
-              </a:rPr>
-              <a:t>a nine-period EMA of the MACD line; n</a:t>
-            </a:r>
-            <a:r>
-              <a:rPr lang="en-US" sz="1600" dirty="0">
-                <a:solidFill>
-                  <a:schemeClr val="bg1">
-                    <a:lumMod val="75000"/>
-                  </a:schemeClr>
-                </a:solidFill>
-                <a:latin typeface="Roboto" panose="02000000000000000000" pitchFamily="2" charset="0"/>
-              </a:rPr>
-              <a:t>ormally consist of moving averages used in combination with other technical indicators to generate buy or sell signals</a:t>
-            </a:r>
-          </a:p>
-          <a:p>
-            <a:endParaRPr lang="en-US" sz="1600" dirty="0">
-              <a:solidFill>
-                <a:schemeClr val="bg1">
-                  <a:lumMod val="75000"/>
-                </a:schemeClr>
-              </a:solidFill>
-              <a:latin typeface="Arial" panose="020B0604020202020204" pitchFamily="34" charset="0"/>
-              <a:cs typeface="Arial" panose="020B0604020202020204" pitchFamily="34" charset="0"/>
-            </a:endParaRPr>
-          </a:p>
-          <a:p>
-            <a:endParaRPr lang="en-US" sz="1600" b="1" dirty="0">
-              <a:solidFill>
-                <a:schemeClr val="bg1">
-                  <a:lumMod val="75000"/>
-                </a:schemeClr>
-              </a:solidFill>
-              <a:latin typeface="Arial" panose="020B0604020202020204" pitchFamily="34" charset="0"/>
-              <a:cs typeface="Arial" panose="020B0604020202020204" pitchFamily="34" charset="0"/>
-            </a:endParaRPr>
-          </a:p>
-          <a:p>
-            <a:r>
-              <a:rPr lang="en-US" sz="1600" b="1" dirty="0">
-                <a:solidFill>
-                  <a:srgbClr val="00B0F0"/>
-                </a:solidFill>
-                <a:latin typeface="Arial" panose="020B0604020202020204" pitchFamily="34" charset="0"/>
-                <a:cs typeface="Arial" panose="020B0604020202020204" pitchFamily="34" charset="0"/>
-              </a:rPr>
-              <a:t>Short – “shorting” / “short selling”: </a:t>
-            </a:r>
-            <a:r>
-              <a:rPr lang="en-US" sz="1600" dirty="0">
-                <a:solidFill>
-                  <a:schemeClr val="bg1">
-                    <a:lumMod val="75000"/>
-                  </a:schemeClr>
-                </a:solidFill>
-                <a:latin typeface="Arial" panose="020B0604020202020204" pitchFamily="34" charset="0"/>
-                <a:cs typeface="Arial" panose="020B0604020202020204" pitchFamily="34" charset="0"/>
-              </a:rPr>
-              <a:t>an investment or trading strategy that speculates on the decline in a stock price; involves borrowing a security whose price you think is going to fall from your brokerage and selling</a:t>
-            </a:r>
-          </a:p>
-          <a:p>
-            <a:endParaRPr lang="en-US" sz="1600" b="1" dirty="0">
-              <a:solidFill>
-                <a:schemeClr val="bg1">
-                  <a:lumMod val="75000"/>
-                </a:schemeClr>
-              </a:solidFill>
-              <a:latin typeface="Arial" panose="020B0604020202020204" pitchFamily="34" charset="0"/>
-              <a:cs typeface="Arial" panose="020B0604020202020204" pitchFamily="34" charset="0"/>
-            </a:endParaRPr>
-          </a:p>
-          <a:p>
-            <a:endParaRPr lang="en-US" sz="1600" b="1" dirty="0">
-              <a:solidFill>
-                <a:schemeClr val="bg1">
-                  <a:lumMod val="75000"/>
-                </a:schemeClr>
-              </a:solidFill>
-              <a:latin typeface="Arial" panose="020B0604020202020204" pitchFamily="34" charset="0"/>
-              <a:cs typeface="Arial" panose="020B0604020202020204" pitchFamily="34" charset="0"/>
-            </a:endParaRPr>
-          </a:p>
-          <a:p>
-            <a:r>
-              <a:rPr lang="en-US" sz="1600" b="1" dirty="0">
-                <a:solidFill>
-                  <a:srgbClr val="00B0F0"/>
-                </a:solidFill>
-                <a:latin typeface="Arial" panose="020B0604020202020204" pitchFamily="34" charset="0"/>
-                <a:cs typeface="Arial" panose="020B0604020202020204" pitchFamily="34" charset="0"/>
-              </a:rPr>
-              <a:t>Long – “taking a long position”:  </a:t>
-            </a:r>
-            <a:r>
-              <a:rPr lang="en-US" sz="1600" b="1" dirty="0">
-                <a:solidFill>
-                  <a:schemeClr val="bg1">
-                    <a:lumMod val="75000"/>
-                  </a:schemeClr>
-                </a:solidFill>
-                <a:latin typeface="Arial" panose="020B0604020202020204" pitchFamily="34" charset="0"/>
-                <a:cs typeface="Arial" panose="020B0604020202020204" pitchFamily="34" charset="0"/>
-              </a:rPr>
-              <a:t>h</a:t>
-            </a:r>
-            <a:r>
-              <a:rPr lang="en-US" sz="1600" dirty="0">
-                <a:solidFill>
-                  <a:schemeClr val="bg1">
-                    <a:lumMod val="75000"/>
-                  </a:schemeClr>
-                </a:solidFill>
-                <a:latin typeface="Arial" panose="020B0604020202020204" pitchFamily="34" charset="0"/>
-                <a:cs typeface="Arial" panose="020B0604020202020204" pitchFamily="34" charset="0"/>
-              </a:rPr>
-              <a:t>aving a “long” position in a security means that you own the security</a:t>
-            </a:r>
-          </a:p>
-        </p:txBody>
-      </p:sp>
     </p:spTree>
     <p:extLst>
       <p:ext uri="{BB962C8B-B14F-4D97-AF65-F5344CB8AC3E}">
-        <p14:creationId xmlns:p14="http://schemas.microsoft.com/office/powerpoint/2010/main" val="743792969"/>
+        <p14:creationId xmlns:p14="http://schemas.microsoft.com/office/powerpoint/2010/main" val="1689103088"/>
       </p:ext>
     </p:extLst>
   </p:cSld>
@@ -12209,17 +12100,17 @@
                 <a:latin typeface="Arial" panose="020B0604020202020204" pitchFamily="34" charset="0"/>
                 <a:cs typeface="Arial" panose="020B0604020202020204" pitchFamily="34" charset="0"/>
               </a:rPr>
-              <a:t>Frame the Problem</a:t>
-            </a:r>
-          </a:p>
-        </p:txBody>
-      </p:sp>
-      <p:sp>
-        <p:nvSpPr>
-          <p:cNvPr id="8" name="TextBox 7">
-            <a:extLst>
-              <a:ext uri="{FF2B5EF4-FFF2-40B4-BE49-F238E27FC236}">
-                <a16:creationId xmlns:a16="http://schemas.microsoft.com/office/drawing/2014/main" id="{A52CF821-9288-CE2D-732A-450345E1ED3B}"/>
+              <a:t>Terms Defined</a:t>
+            </a:r>
+          </a:p>
+        </p:txBody>
+      </p:sp>
+      <p:sp>
+        <p:nvSpPr>
+          <p:cNvPr id="13" name="TextBox 12">
+            <a:extLst>
+              <a:ext uri="{FF2B5EF4-FFF2-40B4-BE49-F238E27FC236}">
+                <a16:creationId xmlns:a16="http://schemas.microsoft.com/office/drawing/2014/main" id="{C6953872-7153-48AC-A7C8-56CD5742EB34}"/>
               </a:ext>
             </a:extLst>
           </p:cNvPr>
@@ -12228,8 +12119,62 @@
         </p:nvSpPr>
         <p:spPr>
           <a:xfrm>
-            <a:off x="2819397" y="2213313"/>
-            <a:ext cx="6924676" cy="2862322"/>
+            <a:off x="7886700" y="112991"/>
+            <a:ext cx="4186239" cy="523220"/>
+          </a:xfrm>
+          <a:prstGeom prst="rect">
+            <a:avLst/>
+          </a:prstGeom>
+          <a:noFill/>
+        </p:spPr>
+        <p:txBody>
+          <a:bodyPr wrap="square" rtlCol="0">
+            <a:spAutoFit/>
+          </a:bodyPr>
+          <a:lstStyle/>
+          <a:p>
+            <a:pPr algn="r"/>
+            <a:r>
+              <a:rPr lang="en-US" sz="1400" i="1" dirty="0">
+                <a:solidFill>
+                  <a:schemeClr val="bg1">
+                    <a:lumMod val="75000"/>
+                  </a:schemeClr>
+                </a:solidFill>
+                <a:latin typeface="Arial" panose="020B0604020202020204" pitchFamily="34" charset="0"/>
+                <a:cs typeface="Arial" panose="020B0604020202020204" pitchFamily="34" charset="0"/>
+              </a:rPr>
+              <a:t>Briefer: Erin O’Leary</a:t>
+            </a:r>
+          </a:p>
+          <a:p>
+            <a:pPr algn="r"/>
+            <a:endParaRPr lang="en-US" sz="1400" dirty="0">
+              <a:solidFill>
+                <a:schemeClr val="bg1"/>
+              </a:solidFill>
+              <a:latin typeface="Arial" panose="020B0604020202020204" pitchFamily="34" charset="0"/>
+              <a:cs typeface="Arial" panose="020B0604020202020204" pitchFamily="34" charset="0"/>
+            </a:endParaRPr>
+          </a:p>
+        </p:txBody>
+      </p:sp>
+      <p:sp>
+        <p:nvSpPr>
+          <p:cNvPr id="7" name="TextBox 6">
+            <a:extLst>
+              <a:ext uri="{FF2B5EF4-FFF2-40B4-BE49-F238E27FC236}">
+                <a16:creationId xmlns:a16="http://schemas.microsoft.com/office/drawing/2014/main" id="{C4DAEBEA-FD9A-DB8D-F134-7A2EA15C144B}"/>
+              </a:ext>
+            </a:extLst>
+          </p:cNvPr>
+          <p:cNvSpPr txBox="1"/>
+          <p:nvPr/>
+        </p:nvSpPr>
+        <p:spPr>
+          <a:xfrm>
+            <a:off x="838200" y="1967021"/>
+            <a:ext cx="10945368" cy="4031873"/>
           </a:xfrm>
           <a:prstGeom prst="rect">
             <a:avLst/>
@@ -12242,80 +12187,82 @@
           </a:bodyPr>
           <a:lstStyle/>
           <a:p>
-            <a:pPr marL="285750" indent="-285750">
-              <a:buFont typeface="Arial" panose="020B0604020202020204" pitchFamily="34" charset="0"/>
-              <a:buChar char="•"/>
-            </a:pPr>
-            <a:r>
-              <a:rPr lang="en-US" b="0" i="0" dirty="0">
+            <a:r>
+              <a:rPr lang="en-US" sz="1600" b="1" i="0" dirty="0">
+                <a:solidFill>
+                  <a:srgbClr val="00B0F0"/>
+                </a:solidFill>
+                <a:effectLst/>
+                <a:latin typeface="Arial" panose="020B0604020202020204" pitchFamily="34" charset="0"/>
+                <a:cs typeface="Arial" panose="020B0604020202020204" pitchFamily="34" charset="0"/>
+              </a:rPr>
+              <a:t>Moving Average Convergence and Divergence (MACD):  </a:t>
+            </a:r>
+            <a:r>
+              <a:rPr lang="en-US" sz="1600" b="0" i="0" dirty="0">
                 <a:solidFill>
                   <a:schemeClr val="bg1">
                     <a:lumMod val="75000"/>
                   </a:schemeClr>
                 </a:solidFill>
                 <a:effectLst/>
-                <a:latin typeface="Arial" panose="020B0604020202020204" pitchFamily="34" charset="0"/>
-                <a:cs typeface="Arial" panose="020B0604020202020204" pitchFamily="34" charset="0"/>
-              </a:rPr>
-              <a:t>Our project aims at establishing security trading recommendations depending on moving average convergence and divergence, using exponential moving averages of closing prices of time series data frame.</a:t>
-            </a:r>
-          </a:p>
-          <a:p>
-            <a:endParaRPr lang="en-US" b="0" i="0" dirty="0">
+                <a:latin typeface="Roboto" panose="02000000000000000000" pitchFamily="2" charset="0"/>
+              </a:rPr>
+              <a:t>a trend-following momentum indicator that shows the relationship between two exponential moving averages (EMAs) of a security's price</a:t>
+            </a:r>
+          </a:p>
+          <a:p>
+            <a:endParaRPr lang="en-US" sz="1600" dirty="0">
               <a:solidFill>
                 <a:schemeClr val="bg1">
                   <a:lumMod val="75000"/>
                 </a:schemeClr>
               </a:solidFill>
-              <a:effectLst/>
+              <a:latin typeface="Roboto" panose="02000000000000000000" pitchFamily="2" charset="0"/>
+            </a:endParaRPr>
+          </a:p>
+          <a:p>
+            <a:endParaRPr lang="en-US" sz="1600" dirty="0">
+              <a:solidFill>
+                <a:srgbClr val="00B0F0"/>
+              </a:solidFill>
               <a:latin typeface="Arial" panose="020B0604020202020204" pitchFamily="34" charset="0"/>
               <a:cs typeface="Arial" panose="020B0604020202020204" pitchFamily="34" charset="0"/>
             </a:endParaRPr>
           </a:p>
           <a:p>
-            <a:pPr marL="285750" indent="-285750">
-              <a:buFont typeface="Arial" panose="020B0604020202020204" pitchFamily="34" charset="0"/>
-              <a:buChar char="•"/>
-            </a:pPr>
-            <a:r>
-              <a:rPr lang="en-US" b="0" i="0" dirty="0">
+            <a:r>
+              <a:rPr lang="en-US" sz="1600" b="1" dirty="0">
+                <a:solidFill>
+                  <a:srgbClr val="00B0F0"/>
+                </a:solidFill>
+                <a:latin typeface="Arial" panose="020B0604020202020204" pitchFamily="34" charset="0"/>
+                <a:cs typeface="Arial" panose="020B0604020202020204" pitchFamily="34" charset="0"/>
+              </a:rPr>
+              <a:t>Exponentially Weighted Moving Average (EWMA):  </a:t>
+            </a:r>
+            <a:r>
+              <a:rPr lang="en-US" sz="1600" dirty="0">
                 <a:solidFill>
                   <a:schemeClr val="bg1">
                     <a:lumMod val="75000"/>
                   </a:schemeClr>
                 </a:solidFill>
-                <a:effectLst/>
                 <a:latin typeface="Arial" panose="020B0604020202020204" pitchFamily="34" charset="0"/>
                 <a:cs typeface="Arial" panose="020B0604020202020204" pitchFamily="34" charset="0"/>
               </a:rPr>
-              <a:t>The “MACD</a:t>
-            </a:r>
-            <a:r>
-              <a:rPr lang="en-US" dirty="0">
-                <a:solidFill>
-                  <a:schemeClr val="bg1">
-                    <a:lumMod val="75000"/>
-                  </a:schemeClr>
-                </a:solidFill>
-                <a:latin typeface="Arial" panose="020B0604020202020204" pitchFamily="34" charset="0"/>
-                <a:cs typeface="Arial" panose="020B0604020202020204" pitchFamily="34" charset="0"/>
-              </a:rPr>
-              <a:t>”</a:t>
-            </a:r>
-            <a:r>
-              <a:rPr lang="en-US" b="0" i="0" dirty="0">
-                <a:solidFill>
-                  <a:schemeClr val="bg1">
-                    <a:lumMod val="75000"/>
-                  </a:schemeClr>
-                </a:solidFill>
-                <a:effectLst/>
-                <a:latin typeface="Arial" panose="020B0604020202020204" pitchFamily="34" charset="0"/>
-                <a:cs typeface="Arial" panose="020B0604020202020204" pitchFamily="34" charset="0"/>
-              </a:rPr>
-              <a:t> is a popular technical indicator used in trading and investing to identify potential  trend reversals, generate buy or sell signals, and  assess the overall momentum of an asset.</a:t>
-            </a:r>
-            <a:endParaRPr lang="en-US" dirty="0">
+              <a:t>quantitative/statistical measure used to model a time series</a:t>
+            </a:r>
+            <a:endParaRPr lang="en-US" sz="1600" b="0" i="0" dirty="0">
+              <a:solidFill>
+                <a:srgbClr val="636E72"/>
+              </a:solidFill>
+              <a:effectLst/>
+              <a:latin typeface="Inter"/>
+            </a:endParaRPr>
+          </a:p>
+          <a:p>
+            <a:endParaRPr lang="en-US" sz="1600" dirty="0">
               <a:solidFill>
                 <a:schemeClr val="bg1">
                   <a:lumMod val="75000"/>
@@ -12326,81 +12273,29 @@
             </a:endParaRPr>
           </a:p>
           <a:p>
-            <a:r>
-              <a:rPr lang="en-US" dirty="0">
-                <a:solidFill>
-                  <a:schemeClr val="bg1">
-                    <a:lumMod val="75000"/>
-                  </a:schemeClr>
-                </a:solidFill>
-                <a:latin typeface="Arial" panose="020B0604020202020204" pitchFamily="34" charset="0"/>
-                <a:cs typeface="Arial" panose="020B0604020202020204" pitchFamily="34" charset="0"/>
-              </a:rPr>
-              <a:t>     </a:t>
-            </a:r>
-            <a:r>
-              <a:rPr lang="en-US" b="0" dirty="0">
-                <a:solidFill>
-                  <a:schemeClr val="bg1">
-                    <a:lumMod val="75000"/>
-                  </a:schemeClr>
-                </a:solidFill>
-                <a:effectLst/>
-                <a:latin typeface="Arial" panose="020B0604020202020204" pitchFamily="34" charset="0"/>
-                <a:cs typeface="Arial" panose="020B0604020202020204" pitchFamily="34" charset="0"/>
-              </a:rPr>
-              <a:t>It  consists of two lines: the MACD line and the signal line.</a:t>
-            </a:r>
-            <a:br>
-              <a:rPr lang="en-US" dirty="0">
-                <a:solidFill>
-                  <a:schemeClr val="bg1">
-                    <a:lumMod val="75000"/>
-                  </a:schemeClr>
-                </a:solidFill>
-              </a:rPr>
-            </a:br>
-            <a:endParaRPr lang="en-US" dirty="0">
+            <a:endParaRPr lang="en-US" sz="1600" b="1" dirty="0">
               <a:solidFill>
                 <a:schemeClr val="bg1">
                   <a:lumMod val="75000"/>
                 </a:schemeClr>
               </a:solidFill>
+              <a:latin typeface="Arial" panose="020B0604020202020204" pitchFamily="34" charset="0"/>
+              <a:cs typeface="Arial" panose="020B0604020202020204" pitchFamily="34" charset="0"/>
             </a:endParaRPr>
           </a:p>
-        </p:txBody>
-      </p:sp>
-      <p:sp>
-        <p:nvSpPr>
-          <p:cNvPr id="10" name="TextBox 9">
-            <a:extLst>
-              <a:ext uri="{FF2B5EF4-FFF2-40B4-BE49-F238E27FC236}">
-                <a16:creationId xmlns:a16="http://schemas.microsoft.com/office/drawing/2014/main" id="{991DB775-62CE-BC9F-AD32-1DEE38E317B0}"/>
-              </a:ext>
-            </a:extLst>
-          </p:cNvPr>
-          <p:cNvSpPr txBox="1"/>
-          <p:nvPr/>
-        </p:nvSpPr>
-        <p:spPr>
-          <a:xfrm>
-            <a:off x="7886700" y="112991"/>
-            <a:ext cx="4186239" cy="523220"/>
-          </a:xfrm>
-          <a:prstGeom prst="rect">
-            <a:avLst/>
-          </a:prstGeom>
-          <a:noFill/>
-        </p:spPr>
-        <p:txBody>
-          <a:bodyPr wrap="square" rtlCol="0">
-            <a:spAutoFit/>
-          </a:bodyPr>
-          <a:lstStyle/>
-          <a:p>
-            <a:pPr algn="r"/>
-            <a:r>
-              <a:rPr lang="en-US" sz="1400" i="1" dirty="0">
+          <a:p>
+            <a:r>
+              <a:rPr lang="en-US" sz="1600" b="1" dirty="0">
+                <a:solidFill>
+                  <a:srgbClr val="00B0F0"/>
+                </a:solidFill>
+                <a:latin typeface="Arial" panose="020B0604020202020204" pitchFamily="34" charset="0"/>
+                <a:cs typeface="Arial" panose="020B0604020202020204" pitchFamily="34" charset="0"/>
+              </a:rPr>
+              <a:t>Signal line:  </a:t>
+            </a:r>
+            <a:r>
+              <a:rPr lang="en-US" sz="1600" dirty="0">
                 <a:solidFill>
                   <a:schemeClr val="bg1">
                     <a:lumMod val="75000"/>
@@ -12409,25 +12304,130 @@
                 <a:latin typeface="Arial" panose="020B0604020202020204" pitchFamily="34" charset="0"/>
                 <a:cs typeface="Arial" panose="020B0604020202020204" pitchFamily="34" charset="0"/>
               </a:rPr>
-              <a:t>Briefer: Erin O’Leary</a:t>
-            </a:r>
-          </a:p>
-          <a:p>
-            <a:pPr algn="r"/>
-            <a:endParaRPr lang="en-US" sz="1400" dirty="0">
+              <a:t>a nine-period EMA of the MACD line; n</a:t>
+            </a:r>
+            <a:r>
+              <a:rPr lang="en-US" sz="1600" dirty="0">
+                <a:solidFill>
+                  <a:schemeClr val="bg1">
+                    <a:lumMod val="75000"/>
+                  </a:schemeClr>
+                </a:solidFill>
+                <a:latin typeface="Roboto" panose="02000000000000000000" pitchFamily="2" charset="0"/>
+              </a:rPr>
+              <a:t>ormally consist of moving averages used in combination with other technical indicators to generate buy or sell signals</a:t>
+            </a:r>
+          </a:p>
+          <a:p>
+            <a:endParaRPr lang="en-US" sz="1600" dirty="0">
               <a:solidFill>
-                <a:schemeClr val="bg1"/>
+                <a:schemeClr val="bg1">
+                  <a:lumMod val="75000"/>
+                </a:schemeClr>
               </a:solidFill>
               <a:latin typeface="Arial" panose="020B0604020202020204" pitchFamily="34" charset="0"/>
               <a:cs typeface="Arial" panose="020B0604020202020204" pitchFamily="34" charset="0"/>
             </a:endParaRPr>
           </a:p>
+          <a:p>
+            <a:endParaRPr lang="en-US" sz="1600" b="1" dirty="0">
+              <a:solidFill>
+                <a:schemeClr val="bg1">
+                  <a:lumMod val="75000"/>
+                </a:schemeClr>
+              </a:solidFill>
+              <a:latin typeface="Arial" panose="020B0604020202020204" pitchFamily="34" charset="0"/>
+              <a:cs typeface="Arial" panose="020B0604020202020204" pitchFamily="34" charset="0"/>
+            </a:endParaRPr>
+          </a:p>
+          <a:p>
+            <a:r>
+              <a:rPr lang="en-US" sz="1600" b="1" dirty="0">
+                <a:solidFill>
+                  <a:srgbClr val="00B0F0"/>
+                </a:solidFill>
+                <a:latin typeface="Arial" panose="020B0604020202020204" pitchFamily="34" charset="0"/>
+                <a:cs typeface="Arial" panose="020B0604020202020204" pitchFamily="34" charset="0"/>
+              </a:rPr>
+              <a:t>Short – “shorting” / “short selling”: </a:t>
+            </a:r>
+            <a:r>
+              <a:rPr lang="en-US" sz="1600" dirty="0">
+                <a:solidFill>
+                  <a:schemeClr val="bg1">
+                    <a:lumMod val="75000"/>
+                  </a:schemeClr>
+                </a:solidFill>
+                <a:latin typeface="Arial" panose="020B0604020202020204" pitchFamily="34" charset="0"/>
+                <a:cs typeface="Arial" panose="020B0604020202020204" pitchFamily="34" charset="0"/>
+              </a:rPr>
+              <a:t>an investment or trading strategy that speculates on the decline in a stock price; involves borrowing a security whose price you think is going to fall from your brokerage and selling</a:t>
+            </a:r>
+          </a:p>
+          <a:p>
+            <a:endParaRPr lang="en-US" sz="1600" b="1" dirty="0">
+              <a:solidFill>
+                <a:schemeClr val="bg1">
+                  <a:lumMod val="75000"/>
+                </a:schemeClr>
+              </a:solidFill>
+              <a:latin typeface="Arial" panose="020B0604020202020204" pitchFamily="34" charset="0"/>
+              <a:cs typeface="Arial" panose="020B0604020202020204" pitchFamily="34" charset="0"/>
+            </a:endParaRPr>
+          </a:p>
+          <a:p>
+            <a:endParaRPr lang="en-US" sz="1600" b="1" dirty="0">
+              <a:solidFill>
+                <a:schemeClr val="bg1">
+                  <a:lumMod val="75000"/>
+                </a:schemeClr>
+              </a:solidFill>
+              <a:latin typeface="Arial" panose="020B0604020202020204" pitchFamily="34" charset="0"/>
+              <a:cs typeface="Arial" panose="020B0604020202020204" pitchFamily="34" charset="0"/>
+            </a:endParaRPr>
+          </a:p>
+          <a:p>
+            <a:r>
+              <a:rPr lang="en-US" sz="1600" b="1" dirty="0">
+                <a:solidFill>
+                  <a:srgbClr val="00B0F0"/>
+                </a:solidFill>
+                <a:latin typeface="Arial" panose="020B0604020202020204" pitchFamily="34" charset="0"/>
+                <a:cs typeface="Arial" panose="020B0604020202020204" pitchFamily="34" charset="0"/>
+              </a:rPr>
+              <a:t>Long – “taking a long position”:  </a:t>
+            </a:r>
+            <a:r>
+              <a:rPr lang="en-US" sz="1600" b="1" dirty="0">
+                <a:solidFill>
+                  <a:schemeClr val="bg1">
+                    <a:lumMod val="75000"/>
+                  </a:schemeClr>
+                </a:solidFill>
+                <a:latin typeface="Arial" panose="020B0604020202020204" pitchFamily="34" charset="0"/>
+                <a:cs typeface="Arial" panose="020B0604020202020204" pitchFamily="34" charset="0"/>
+              </a:rPr>
+              <a:t>h</a:t>
+            </a:r>
+            <a:r>
+              <a:rPr lang="en-US" sz="1600" dirty="0">
+                <a:solidFill>
+                  <a:schemeClr val="bg1">
+                    <a:lumMod val="75000"/>
+                  </a:schemeClr>
+                </a:solidFill>
+                <a:latin typeface="Arial" panose="020B0604020202020204" pitchFamily="34" charset="0"/>
+                <a:cs typeface="Arial" panose="020B0604020202020204" pitchFamily="34" charset="0"/>
+              </a:rPr>
+              <a:t>aving a “long” position in a security means that you own the security</a:t>
+            </a:r>
+          </a:p>
         </p:txBody>
       </p:sp>
     </p:spTree>
     <p:extLst>
       <p:ext uri="{BB962C8B-B14F-4D97-AF65-F5344CB8AC3E}">
-        <p14:creationId xmlns:p14="http://schemas.microsoft.com/office/powerpoint/2010/main" val="1689103088"/>
+        <p14:creationId xmlns:p14="http://schemas.microsoft.com/office/powerpoint/2010/main" val="743792969"/>
       </p:ext>
     </p:extLst>
   </p:cSld>

</xml_diff>

<commit_message>
Latest change w Michael's edits
</commit_message>
<xml_diff>
--- a/MACD_Indicators_Group_2.pptx
+++ b/MACD_Indicators_Group_2.pptx
@@ -24,9 +24,9 @@
     <p:sldId id="270" r:id="rId15"/>
     <p:sldId id="262" r:id="rId16"/>
     <p:sldId id="274" r:id="rId17"/>
-    <p:sldId id="280" r:id="rId18"/>
-    <p:sldId id="273" r:id="rId19"/>
-    <p:sldId id="266" r:id="rId20"/>
+    <p:sldId id="281" r:id="rId18"/>
+    <p:sldId id="280" r:id="rId19"/>
+    <p:sldId id="273" r:id="rId20"/>
     <p:sldId id="263" r:id="rId21"/>
     <p:sldId id="264" r:id="rId22"/>
     <p:sldId id="265" r:id="rId23"/>
@@ -8320,7 +8320,7 @@
 </file>
 
 <file path=ppt/slides/slide17.xml><?xml version="1.0" encoding="utf-8"?>
-<p:sld xmlns:a="http://schemas.openxmlformats.org/drawingml/2006/main" xmlns:r="http://schemas.openxmlformats.org/officeDocument/2006/relationships" xmlns:p="http://schemas.openxmlformats.org/presentationml/2006/main" show="0">
+<p:sld xmlns:a="http://schemas.openxmlformats.org/drawingml/2006/main" xmlns:r="http://schemas.openxmlformats.org/officeDocument/2006/relationships" xmlns:p="http://schemas.openxmlformats.org/presentationml/2006/main">
   <p:cSld>
     <p:spTree>
       <p:nvGrpSpPr>
@@ -8620,8 +8620,29 @@
                 <a:latin typeface="Arial" panose="020B0604020202020204" pitchFamily="34" charset="0"/>
                 <a:cs typeface="Arial" panose="020B0604020202020204" pitchFamily="34" charset="0"/>
               </a:rPr>
-              <a:t>Briefer: Ryan Stowers</a:t>
-            </a:r>
+              <a:t>Briefer: Michael </a:t>
+            </a:r>
+            <a:r>
+              <a:rPr lang="en-US" sz="1400" i="1" dirty="0" err="1">
+                <a:solidFill>
+                  <a:schemeClr val="bg1">
+                    <a:lumMod val="75000"/>
+                  </a:schemeClr>
+                </a:solidFill>
+                <a:latin typeface="Arial" panose="020B0604020202020204" pitchFamily="34" charset="0"/>
+                <a:cs typeface="Arial" panose="020B0604020202020204" pitchFamily="34" charset="0"/>
+              </a:rPr>
+              <a:t>Drinkard</a:t>
+            </a:r>
+            <a:endParaRPr lang="en-US" sz="1400" i="1" dirty="0">
+              <a:solidFill>
+                <a:schemeClr val="bg1">
+                  <a:lumMod val="75000"/>
+                </a:schemeClr>
+              </a:solidFill>
+              <a:latin typeface="Arial" panose="020B0604020202020204" pitchFamily="34" charset="0"/>
+              <a:cs typeface="Arial" panose="020B0604020202020204" pitchFamily="34" charset="0"/>
+            </a:endParaRPr>
           </a:p>
           <a:p>
             <a:pPr algn="r"/>
@@ -8673,45 +8694,94 @@
                 <a:latin typeface="Arial" panose="020B0604020202020204" pitchFamily="34" charset="0"/>
                 <a:cs typeface="Arial" panose="020B0604020202020204" pitchFamily="34" charset="0"/>
               </a:rPr>
-              <a:t>This is the signal line. We start off buying at the open, then when the MACD line pass the signal line we sell because the signal line is indicating a downwards trend.</a:t>
-            </a:r>
-          </a:p>
-        </p:txBody>
-      </p:sp>
-      <p:pic>
-        <p:nvPicPr>
-          <p:cNvPr id="7" name="Picture 6">
-            <a:extLst>
-              <a:ext uri="{FF2B5EF4-FFF2-40B4-BE49-F238E27FC236}">
-                <a16:creationId xmlns:a16="http://schemas.microsoft.com/office/drawing/2014/main" id="{F58A42AF-9850-CA0C-37A2-61780B2D26F5}"/>
-              </a:ext>
-            </a:extLst>
-          </p:cNvPr>
-          <p:cNvPicPr>
-            <a:picLocks noChangeAspect="1"/>
-          </p:cNvPicPr>
+              <a:t>This is a short example of what the trades look like as time stamps.  We start off buying at the open, then when the MACD line pass the signal line we sell because the signal line is indicating a downwards trend.</a:t>
+            </a:r>
+          </a:p>
+        </p:txBody>
+      </p:sp>
+      <p:grpSp>
+        <p:nvGrpSpPr>
+          <p:cNvPr id="16" name="Group 15">
+            <a:extLst>
+              <a:ext uri="{FF2B5EF4-FFF2-40B4-BE49-F238E27FC236}">
+                <a16:creationId xmlns:a16="http://schemas.microsoft.com/office/drawing/2014/main" id="{821680B3-8D51-7FC1-831C-79328DD68062}"/>
+              </a:ext>
+            </a:extLst>
+          </p:cNvPr>
+          <p:cNvGrpSpPr/>
           <p:nvPr/>
-        </p:nvPicPr>
-        <p:blipFill>
-          <a:blip r:embed="rId2"/>
-          <a:stretch>
-            <a:fillRect/>
-          </a:stretch>
-        </p:blipFill>
-        <p:spPr>
-          <a:xfrm>
-            <a:off x="2312435" y="2012951"/>
-            <a:ext cx="7430208" cy="4621227"/>
-          </a:xfrm>
-          <a:prstGeom prst="rect">
-            <a:avLst/>
-          </a:prstGeom>
-        </p:spPr>
-      </p:pic>
+        </p:nvGrpSpPr>
+        <p:grpSpPr>
+          <a:xfrm>
+            <a:off x="1001592" y="2636332"/>
+            <a:ext cx="10155740" cy="3032686"/>
+            <a:chOff x="1298772" y="2899222"/>
+            <a:chExt cx="10155740" cy="3032686"/>
+          </a:xfrm>
+        </p:grpSpPr>
+        <p:pic>
+          <p:nvPicPr>
+            <p:cNvPr id="7" name="Picture 6">
+              <a:extLst>
+                <a:ext uri="{FF2B5EF4-FFF2-40B4-BE49-F238E27FC236}">
+                  <a16:creationId xmlns:a16="http://schemas.microsoft.com/office/drawing/2014/main" id="{571CE30E-10EA-AC7B-6C0A-FAF8F7208729}"/>
+                </a:ext>
+              </a:extLst>
+            </p:cNvPr>
+            <p:cNvPicPr>
+              <a:picLocks noChangeAspect="1"/>
+            </p:cNvPicPr>
+            <p:nvPr/>
+          </p:nvPicPr>
+          <p:blipFill rotWithShape="1">
+            <a:blip r:embed="rId2"/>
+            <a:srcRect t="2399"/>
+            <a:stretch/>
+          </p:blipFill>
+          <p:spPr>
+            <a:xfrm>
+              <a:off x="1298772" y="2899222"/>
+              <a:ext cx="7402009" cy="3032685"/>
+            </a:xfrm>
+            <a:prstGeom prst="rect">
+              <a:avLst/>
+            </a:prstGeom>
+          </p:spPr>
+        </p:pic>
+        <p:pic>
+          <p:nvPicPr>
+            <p:cNvPr id="14" name="Picture 13">
+              <a:extLst>
+                <a:ext uri="{FF2B5EF4-FFF2-40B4-BE49-F238E27FC236}">
+                  <a16:creationId xmlns:a16="http://schemas.microsoft.com/office/drawing/2014/main" id="{E29454FD-0812-3AFC-6B9B-3567DCB761A1}"/>
+                </a:ext>
+              </a:extLst>
+            </p:cNvPr>
+            <p:cNvPicPr>
+              <a:picLocks noChangeAspect="1"/>
+            </p:cNvPicPr>
+            <p:nvPr/>
+          </p:nvPicPr>
+          <p:blipFill rotWithShape="1">
+            <a:blip r:embed="rId3"/>
+            <a:srcRect l="4277" t="1038" b="846"/>
+            <a:stretch/>
+          </p:blipFill>
+          <p:spPr>
+            <a:xfrm>
+              <a:off x="8698229" y="2899222"/>
+              <a:ext cx="2756283" cy="3032686"/>
+            </a:xfrm>
+            <a:prstGeom prst="rect">
+              <a:avLst/>
+            </a:prstGeom>
+          </p:spPr>
+        </p:pic>
+      </p:grpSp>
     </p:spTree>
     <p:extLst>
       <p:ext uri="{BB962C8B-B14F-4D97-AF65-F5344CB8AC3E}">
-        <p14:creationId xmlns:p14="http://schemas.microsoft.com/office/powerpoint/2010/main" val="1598778529"/>
+        <p14:creationId xmlns:p14="http://schemas.microsoft.com/office/powerpoint/2010/main" val="3530953962"/>
       </p:ext>
     </p:extLst>
   </p:cSld>
@@ -8985,147 +9055,6 @@
       </p:sp>
       <p:sp>
         <p:nvSpPr>
-          <p:cNvPr id="7" name="TextBox 6">
-            <a:extLst>
-              <a:ext uri="{FF2B5EF4-FFF2-40B4-BE49-F238E27FC236}">
-                <a16:creationId xmlns:a16="http://schemas.microsoft.com/office/drawing/2014/main" id="{24C484EF-37A4-616D-7805-4B1637442430}"/>
-              </a:ext>
-            </a:extLst>
-          </p:cNvPr>
-          <p:cNvSpPr txBox="1"/>
-          <p:nvPr/>
-        </p:nvSpPr>
-        <p:spPr>
-          <a:xfrm>
-            <a:off x="-3525441" y="3306927"/>
-            <a:ext cx="3406379" cy="1477328"/>
-          </a:xfrm>
-          <a:prstGeom prst="rect">
-            <a:avLst/>
-          </a:prstGeom>
-          <a:noFill/>
-        </p:spPr>
-        <p:txBody>
-          <a:bodyPr wrap="square">
-            <a:spAutoFit/>
-          </a:bodyPr>
-          <a:lstStyle/>
-          <a:p>
-            <a:pPr algn="l"/>
-            <a:r>
-              <a:rPr lang="en-US" b="0" i="0" dirty="0">
-                <a:solidFill>
-                  <a:schemeClr val="bg1"/>
-                </a:solidFill>
-                <a:effectLst/>
-                <a:latin typeface="Slack-Lato"/>
-              </a:rPr>
-              <a:t>Analysis – Michael[SPY] Ryan[AAPL]</a:t>
-            </a:r>
-            <a:br>
-              <a:rPr lang="en-US" b="0" i="0" dirty="0">
-                <a:solidFill>
-                  <a:schemeClr val="bg1"/>
-                </a:solidFill>
-                <a:effectLst/>
-                <a:latin typeface="Slack-Lato"/>
-              </a:rPr>
-            </a:br>
-            <a:endParaRPr lang="en-US" b="0" i="0" dirty="0">
-              <a:solidFill>
-                <a:schemeClr val="bg1"/>
-              </a:solidFill>
-              <a:effectLst/>
-              <a:latin typeface="Slack-Lato"/>
-            </a:endParaRPr>
-          </a:p>
-          <a:p>
-            <a:br>
-              <a:rPr lang="en-US" b="0" i="0" dirty="0">
-                <a:solidFill>
-                  <a:srgbClr val="1D1C1D"/>
-                </a:solidFill>
-                <a:effectLst/>
-                <a:latin typeface="Slack-Lato"/>
-              </a:rPr>
-            </a:br>
-            <a:endParaRPr lang="en-US" dirty="0"/>
-          </a:p>
-        </p:txBody>
-      </p:sp>
-      <p:sp>
-        <p:nvSpPr>
-          <p:cNvPr id="8" name="TextBox 7">
-            <a:extLst>
-              <a:ext uri="{FF2B5EF4-FFF2-40B4-BE49-F238E27FC236}">
-                <a16:creationId xmlns:a16="http://schemas.microsoft.com/office/drawing/2014/main" id="{38413B10-3FC5-14EC-7CFD-B97C2E54EE71}"/>
-              </a:ext>
-            </a:extLst>
-          </p:cNvPr>
-          <p:cNvSpPr txBox="1"/>
-          <p:nvPr/>
-        </p:nvSpPr>
-        <p:spPr>
-          <a:xfrm>
-            <a:off x="-2999234" y="2103970"/>
-            <a:ext cx="6093618" cy="923330"/>
-          </a:xfrm>
-          <a:prstGeom prst="rect">
-            <a:avLst/>
-          </a:prstGeom>
-          <a:noFill/>
-        </p:spPr>
-        <p:txBody>
-          <a:bodyPr wrap="square">
-            <a:spAutoFit/>
-          </a:bodyPr>
-          <a:lstStyle/>
-          <a:p>
-            <a:pPr algn="l"/>
-            <a:r>
-              <a:rPr lang="en-US" b="0" i="0" dirty="0">
-                <a:solidFill>
-                  <a:schemeClr val="bg1"/>
-                </a:solidFill>
-                <a:effectLst/>
-                <a:latin typeface="Slack-Lato"/>
-              </a:rPr>
-              <a:t>What were the outputs?</a:t>
-            </a:r>
-            <a:br>
-              <a:rPr lang="en-US" b="0" i="0" dirty="0">
-                <a:solidFill>
-                  <a:schemeClr val="bg1"/>
-                </a:solidFill>
-                <a:effectLst/>
-                <a:latin typeface="Slack-Lato"/>
-              </a:rPr>
-            </a:br>
-            <a:endParaRPr lang="en-US" b="0" i="0" dirty="0">
-              <a:solidFill>
-                <a:schemeClr val="bg1"/>
-              </a:solidFill>
-              <a:effectLst/>
-              <a:latin typeface="Slack-Lato"/>
-            </a:endParaRPr>
-          </a:p>
-          <a:p>
-            <a:pPr algn="l"/>
-            <a:r>
-              <a:rPr lang="en-US" b="0" i="0" dirty="0">
-                <a:solidFill>
-                  <a:schemeClr val="bg1"/>
-                </a:solidFill>
-                <a:effectLst/>
-                <a:latin typeface="Slack-Lato"/>
-              </a:rPr>
-              <a:t>What did the outputs tell us?</a:t>
-            </a:r>
-          </a:p>
-        </p:txBody>
-      </p:sp>
-      <p:sp>
-        <p:nvSpPr>
           <p:cNvPr id="12" name="TextBox 11">
             <a:extLst>
               <a:ext uri="{FF2B5EF4-FFF2-40B4-BE49-F238E27FC236}">
@@ -9192,8 +9121,8 @@
         </p:nvSpPr>
         <p:spPr>
           <a:xfrm>
-            <a:off x="318492" y="1378036"/>
-            <a:ext cx="11240096" cy="923330"/>
+            <a:off x="282178" y="1309008"/>
+            <a:ext cx="11490722" cy="646331"/>
           </a:xfrm>
           <a:prstGeom prst="rect">
             <a:avLst/>
@@ -9216,17 +9145,17 @@
                 <a:latin typeface="Arial" panose="020B0604020202020204" pitchFamily="34" charset="0"/>
                 <a:cs typeface="Arial" panose="020B0604020202020204" pitchFamily="34" charset="0"/>
               </a:rPr>
-              <a:t>In this last graph you can see a better picture of when we buy and sell.  For example, we started with buying at the open, then the MACD passes the signal line we sell until it passes it again. At approximately 1:45 the signal line is indicating a upwards trend where we buy until it crosses again to indicate that we sell. </a:t>
+              <a:t>This is the signal line. We start off buying at the open, then when the MACD line pass the signal line we sell because the signal line is indicating a downwards trend.</a:t>
             </a:r>
           </a:p>
         </p:txBody>
       </p:sp>
       <p:pic>
         <p:nvPicPr>
-          <p:cNvPr id="14" name="Picture 13">
-            <a:extLst>
-              <a:ext uri="{FF2B5EF4-FFF2-40B4-BE49-F238E27FC236}">
-                <a16:creationId xmlns:a16="http://schemas.microsoft.com/office/drawing/2014/main" id="{91BFAFC5-6049-8A56-A7C9-67686C0F4FDD}"/>
+          <p:cNvPr id="7" name="Picture 6">
+            <a:extLst>
+              <a:ext uri="{FF2B5EF4-FFF2-40B4-BE49-F238E27FC236}">
+                <a16:creationId xmlns:a16="http://schemas.microsoft.com/office/drawing/2014/main" id="{F58A42AF-9850-CA0C-37A2-61780B2D26F5}"/>
               </a:ext>
             </a:extLst>
           </p:cNvPr>
@@ -9243,8 +9172,8 @@
         </p:blipFill>
         <p:spPr>
           <a:xfrm>
-            <a:off x="1984370" y="2381732"/>
-            <a:ext cx="8218495" cy="4189884"/>
+            <a:off x="2312435" y="2012951"/>
+            <a:ext cx="7430208" cy="4621227"/>
           </a:xfrm>
           <a:prstGeom prst="rect">
             <a:avLst/>
@@ -9254,7 +9183,7 @@
     </p:spTree>
     <p:extLst>
       <p:ext uri="{BB962C8B-B14F-4D97-AF65-F5344CB8AC3E}">
-        <p14:creationId xmlns:p14="http://schemas.microsoft.com/office/powerpoint/2010/main" val="2179045673"/>
+        <p14:creationId xmlns:p14="http://schemas.microsoft.com/office/powerpoint/2010/main" val="1598778529"/>
       </p:ext>
     </p:extLst>
   </p:cSld>
@@ -9265,7 +9194,7 @@
 </file>
 
 <file path=ppt/slides/slide19.xml><?xml version="1.0" encoding="utf-8"?>
-<p:sld xmlns:a="http://schemas.openxmlformats.org/drawingml/2006/main" xmlns:r="http://schemas.openxmlformats.org/officeDocument/2006/relationships" xmlns:p="http://schemas.openxmlformats.org/presentationml/2006/main">
+<p:sld xmlns:a="http://schemas.openxmlformats.org/drawingml/2006/main" xmlns:r="http://schemas.openxmlformats.org/officeDocument/2006/relationships" xmlns:p="http://schemas.openxmlformats.org/presentationml/2006/main" show="0">
   <p:cSld>
     <p:spTree>
       <p:nvGrpSpPr>
@@ -9528,10 +9457,10 @@
       </p:sp>
       <p:sp>
         <p:nvSpPr>
-          <p:cNvPr id="15" name="TextBox 14">
-            <a:extLst>
-              <a:ext uri="{FF2B5EF4-FFF2-40B4-BE49-F238E27FC236}">
-                <a16:creationId xmlns:a16="http://schemas.microsoft.com/office/drawing/2014/main" id="{FCBFDD02-51CC-AC9F-F897-ED1643C6B457}"/>
+          <p:cNvPr id="7" name="TextBox 6">
+            <a:extLst>
+              <a:ext uri="{FF2B5EF4-FFF2-40B4-BE49-F238E27FC236}">
+                <a16:creationId xmlns:a16="http://schemas.microsoft.com/office/drawing/2014/main" id="{24C484EF-37A4-616D-7805-4B1637442430}"/>
               </a:ext>
             </a:extLst>
           </p:cNvPr>
@@ -9540,8 +9469,149 @@
         </p:nvSpPr>
         <p:spPr>
           <a:xfrm>
+            <a:off x="-3525441" y="3306927"/>
+            <a:ext cx="3406379" cy="1477328"/>
+          </a:xfrm>
+          <a:prstGeom prst="rect">
+            <a:avLst/>
+          </a:prstGeom>
+          <a:noFill/>
+        </p:spPr>
+        <p:txBody>
+          <a:bodyPr wrap="square">
+            <a:spAutoFit/>
+          </a:bodyPr>
+          <a:lstStyle/>
+          <a:p>
+            <a:pPr algn="l"/>
+            <a:r>
+              <a:rPr lang="en-US" b="0" i="0" dirty="0">
+                <a:solidFill>
+                  <a:schemeClr val="bg1"/>
+                </a:solidFill>
+                <a:effectLst/>
+                <a:latin typeface="Slack-Lato"/>
+              </a:rPr>
+              <a:t>Analysis – Michael[SPY] Ryan[AAPL]</a:t>
+            </a:r>
+            <a:br>
+              <a:rPr lang="en-US" b="0" i="0" dirty="0">
+                <a:solidFill>
+                  <a:schemeClr val="bg1"/>
+                </a:solidFill>
+                <a:effectLst/>
+                <a:latin typeface="Slack-Lato"/>
+              </a:rPr>
+            </a:br>
+            <a:endParaRPr lang="en-US" b="0" i="0" dirty="0">
+              <a:solidFill>
+                <a:schemeClr val="bg1"/>
+              </a:solidFill>
+              <a:effectLst/>
+              <a:latin typeface="Slack-Lato"/>
+            </a:endParaRPr>
+          </a:p>
+          <a:p>
+            <a:br>
+              <a:rPr lang="en-US" b="0" i="0" dirty="0">
+                <a:solidFill>
+                  <a:srgbClr val="1D1C1D"/>
+                </a:solidFill>
+                <a:effectLst/>
+                <a:latin typeface="Slack-Lato"/>
+              </a:rPr>
+            </a:br>
+            <a:endParaRPr lang="en-US" dirty="0"/>
+          </a:p>
+        </p:txBody>
+      </p:sp>
+      <p:sp>
+        <p:nvSpPr>
+          <p:cNvPr id="8" name="TextBox 7">
+            <a:extLst>
+              <a:ext uri="{FF2B5EF4-FFF2-40B4-BE49-F238E27FC236}">
+                <a16:creationId xmlns:a16="http://schemas.microsoft.com/office/drawing/2014/main" id="{38413B10-3FC5-14EC-7CFD-B97C2E54EE71}"/>
+              </a:ext>
+            </a:extLst>
+          </p:cNvPr>
+          <p:cNvSpPr txBox="1"/>
+          <p:nvPr/>
+        </p:nvSpPr>
+        <p:spPr>
+          <a:xfrm>
+            <a:off x="-2999234" y="2103970"/>
+            <a:ext cx="6093618" cy="923330"/>
+          </a:xfrm>
+          <a:prstGeom prst="rect">
+            <a:avLst/>
+          </a:prstGeom>
+          <a:noFill/>
+        </p:spPr>
+        <p:txBody>
+          <a:bodyPr wrap="square">
+            <a:spAutoFit/>
+          </a:bodyPr>
+          <a:lstStyle/>
+          <a:p>
+            <a:pPr algn="l"/>
+            <a:r>
+              <a:rPr lang="en-US" b="0" i="0" dirty="0">
+                <a:solidFill>
+                  <a:schemeClr val="bg1"/>
+                </a:solidFill>
+                <a:effectLst/>
+                <a:latin typeface="Slack-Lato"/>
+              </a:rPr>
+              <a:t>What were the outputs?</a:t>
+            </a:r>
+            <a:br>
+              <a:rPr lang="en-US" b="0" i="0" dirty="0">
+                <a:solidFill>
+                  <a:schemeClr val="bg1"/>
+                </a:solidFill>
+                <a:effectLst/>
+                <a:latin typeface="Slack-Lato"/>
+              </a:rPr>
+            </a:br>
+            <a:endParaRPr lang="en-US" b="0" i="0" dirty="0">
+              <a:solidFill>
+                <a:schemeClr val="bg1"/>
+              </a:solidFill>
+              <a:effectLst/>
+              <a:latin typeface="Slack-Lato"/>
+            </a:endParaRPr>
+          </a:p>
+          <a:p>
+            <a:pPr algn="l"/>
+            <a:r>
+              <a:rPr lang="en-US" b="0" i="0" dirty="0">
+                <a:solidFill>
+                  <a:schemeClr val="bg1"/>
+                </a:solidFill>
+                <a:effectLst/>
+                <a:latin typeface="Slack-Lato"/>
+              </a:rPr>
+              <a:t>What did the outputs tell us?</a:t>
+            </a:r>
+          </a:p>
+        </p:txBody>
+      </p:sp>
+      <p:sp>
+        <p:nvSpPr>
+          <p:cNvPr id="12" name="TextBox 11">
+            <a:extLst>
+              <a:ext uri="{FF2B5EF4-FFF2-40B4-BE49-F238E27FC236}">
+                <a16:creationId xmlns:a16="http://schemas.microsoft.com/office/drawing/2014/main" id="{0F3E3CE8-0878-0354-74CE-9ACDA279CCCD}"/>
+              </a:ext>
+            </a:extLst>
+          </p:cNvPr>
+          <p:cNvSpPr txBox="1"/>
+          <p:nvPr/>
+        </p:nvSpPr>
+        <p:spPr>
+          <a:xfrm>
             <a:off x="7886700" y="112991"/>
-            <a:ext cx="4186239" cy="738664"/>
+            <a:ext cx="4186239" cy="523220"/>
           </a:xfrm>
           <a:prstGeom prst="rect">
             <a:avLst/>
@@ -9565,41 +9635,8 @@
                 <a:latin typeface="Arial" panose="020B0604020202020204" pitchFamily="34" charset="0"/>
                 <a:cs typeface="Arial" panose="020B0604020202020204" pitchFamily="34" charset="0"/>
               </a:rPr>
-              <a:t>Briefer: Michael </a:t>
-            </a:r>
-            <a:r>
-              <a:rPr lang="en-US" sz="1400" i="1" dirty="0" err="1">
-                <a:solidFill>
-                  <a:schemeClr val="bg1">
-                    <a:lumMod val="75000"/>
-                  </a:schemeClr>
-                </a:solidFill>
-                <a:latin typeface="Arial" panose="020B0604020202020204" pitchFamily="34" charset="0"/>
-                <a:cs typeface="Arial" panose="020B0604020202020204" pitchFamily="34" charset="0"/>
-              </a:rPr>
-              <a:t>Drinkard</a:t>
-            </a:r>
-            <a:endParaRPr lang="en-US" sz="1400" i="1" dirty="0">
-              <a:solidFill>
-                <a:schemeClr val="bg1">
-                  <a:lumMod val="75000"/>
-                </a:schemeClr>
-              </a:solidFill>
-              <a:latin typeface="Arial" panose="020B0604020202020204" pitchFamily="34" charset="0"/>
-              <a:cs typeface="Arial" panose="020B0604020202020204" pitchFamily="34" charset="0"/>
-            </a:endParaRPr>
-          </a:p>
-          <a:p>
-            <a:pPr algn="r"/>
-            <a:endParaRPr lang="en-US" sz="1400" dirty="0">
-              <a:solidFill>
-                <a:schemeClr val="bg1">
-                  <a:lumMod val="75000"/>
-                </a:schemeClr>
-              </a:solidFill>
-              <a:latin typeface="Arial" panose="020B0604020202020204" pitchFamily="34" charset="0"/>
-              <a:cs typeface="Arial" panose="020B0604020202020204" pitchFamily="34" charset="0"/>
-            </a:endParaRPr>
+              <a:t>Briefer: Ryan Stowers</a:t>
+            </a:r>
           </a:p>
           <a:p>
             <a:pPr algn="r"/>
@@ -9615,10 +9652,10 @@
       </p:sp>
       <p:sp>
         <p:nvSpPr>
-          <p:cNvPr id="6" name="TextBox 5">
-            <a:extLst>
-              <a:ext uri="{FF2B5EF4-FFF2-40B4-BE49-F238E27FC236}">
-                <a16:creationId xmlns:a16="http://schemas.microsoft.com/office/drawing/2014/main" id="{26096104-3AB8-C326-EFD0-6D5223ADAE2A}"/>
+          <p:cNvPr id="13" name="TextBox 12">
+            <a:extLst>
+              <a:ext uri="{FF2B5EF4-FFF2-40B4-BE49-F238E27FC236}">
+                <a16:creationId xmlns:a16="http://schemas.microsoft.com/office/drawing/2014/main" id="{5934E4D6-40A6-1091-2230-929980990F95}"/>
               </a:ext>
             </a:extLst>
           </p:cNvPr>
@@ -9627,8 +9664,8 @@
         </p:nvSpPr>
         <p:spPr>
           <a:xfrm>
-            <a:off x="3872508" y="1845822"/>
-            <a:ext cx="8924330" cy="3954929"/>
+            <a:off x="318492" y="1378036"/>
+            <a:ext cx="11240096" cy="923330"/>
           </a:xfrm>
           <a:prstGeom prst="rect">
             <a:avLst/>
@@ -9641,184 +9678,55 @@
           </a:bodyPr>
           <a:lstStyle/>
           <a:p>
-            <a:pPr marL="285750" indent="-285750">
-              <a:buFont typeface="Arial" panose="020B0604020202020204" pitchFamily="34" charset="0"/>
-              <a:buChar char="•"/>
-            </a:pPr>
-            <a:r>
-              <a:rPr lang="en-US" sz="2400" dirty="0">
+            <a:r>
+              <a:rPr lang="en-US" dirty="0">
                 <a:solidFill>
                   <a:schemeClr val="bg1">
-                    <a:lumMod val="75000"/>
+                    <a:lumMod val="85000"/>
                   </a:schemeClr>
                 </a:solidFill>
                 <a:latin typeface="Arial" panose="020B0604020202020204" pitchFamily="34" charset="0"/>
                 <a:cs typeface="Arial" panose="020B0604020202020204" pitchFamily="34" charset="0"/>
               </a:rPr>
-              <a:t>What did we see?</a:t>
-            </a:r>
-          </a:p>
-          <a:p>
-            <a:pPr marL="285750" indent="-285750">
-              <a:buFont typeface="Arial" panose="020B0604020202020204" pitchFamily="34" charset="0"/>
-              <a:buChar char="•"/>
-            </a:pPr>
-            <a:endParaRPr lang="en-US" sz="2400" dirty="0">
-              <a:solidFill>
-                <a:schemeClr val="bg1">
-                  <a:lumMod val="75000"/>
-                </a:schemeClr>
-              </a:solidFill>
-              <a:latin typeface="Arial" panose="020B0604020202020204" pitchFamily="34" charset="0"/>
-              <a:cs typeface="Arial" panose="020B0604020202020204" pitchFamily="34" charset="0"/>
-            </a:endParaRPr>
-          </a:p>
-          <a:p>
-            <a:pPr marL="285750" indent="-285750">
-              <a:buFont typeface="Arial" panose="020B0604020202020204" pitchFamily="34" charset="0"/>
-              <a:buChar char="•"/>
-            </a:pPr>
-            <a:endParaRPr lang="en-US" sz="2400" dirty="0">
-              <a:solidFill>
-                <a:schemeClr val="bg1">
-                  <a:lumMod val="75000"/>
-                </a:schemeClr>
-              </a:solidFill>
-              <a:latin typeface="Arial" panose="020B0604020202020204" pitchFamily="34" charset="0"/>
-              <a:cs typeface="Arial" panose="020B0604020202020204" pitchFamily="34" charset="0"/>
-            </a:endParaRPr>
-          </a:p>
-          <a:p>
-            <a:pPr marL="285750" indent="-285750">
-              <a:buFont typeface="Arial" panose="020B0604020202020204" pitchFamily="34" charset="0"/>
-              <a:buChar char="•"/>
-            </a:pPr>
-            <a:r>
-              <a:rPr lang="en-US" sz="2400" dirty="0">
-                <a:solidFill>
-                  <a:schemeClr val="bg1">
-                    <a:lumMod val="75000"/>
-                  </a:schemeClr>
-                </a:solidFill>
-                <a:latin typeface="Arial" panose="020B0604020202020204" pitchFamily="34" charset="0"/>
-                <a:cs typeface="Arial" panose="020B0604020202020204" pitchFamily="34" charset="0"/>
-              </a:rPr>
-              <a:t>Why did we see it? </a:t>
-            </a:r>
-          </a:p>
-          <a:p>
-            <a:pPr marL="285750" indent="-285750">
-              <a:buFont typeface="Arial" panose="020B0604020202020204" pitchFamily="34" charset="0"/>
-              <a:buChar char="•"/>
-            </a:pPr>
-            <a:endParaRPr lang="en-US" sz="2400" dirty="0">
-              <a:solidFill>
-                <a:schemeClr val="bg1">
-                  <a:lumMod val="75000"/>
-                </a:schemeClr>
-              </a:solidFill>
-              <a:latin typeface="Arial" panose="020B0604020202020204" pitchFamily="34" charset="0"/>
-              <a:cs typeface="Arial" panose="020B0604020202020204" pitchFamily="34" charset="0"/>
-            </a:endParaRPr>
-          </a:p>
-          <a:p>
-            <a:pPr marL="285750" indent="-285750">
-              <a:buFont typeface="Arial" panose="020B0604020202020204" pitchFamily="34" charset="0"/>
-              <a:buChar char="•"/>
-            </a:pPr>
-            <a:endParaRPr lang="en-US" sz="2400" dirty="0">
-              <a:solidFill>
-                <a:schemeClr val="bg1">
-                  <a:lumMod val="75000"/>
-                </a:schemeClr>
-              </a:solidFill>
-              <a:latin typeface="Arial" panose="020B0604020202020204" pitchFamily="34" charset="0"/>
-              <a:cs typeface="Arial" panose="020B0604020202020204" pitchFamily="34" charset="0"/>
-            </a:endParaRPr>
-          </a:p>
-          <a:p>
-            <a:pPr marL="285750" indent="-285750">
-              <a:buFont typeface="Arial" panose="020B0604020202020204" pitchFamily="34" charset="0"/>
-              <a:buChar char="•"/>
-            </a:pPr>
-            <a:r>
-              <a:rPr lang="en-US" sz="2400" dirty="0">
-                <a:solidFill>
-                  <a:schemeClr val="bg1">
-                    <a:lumMod val="75000"/>
-                  </a:schemeClr>
-                </a:solidFill>
-                <a:latin typeface="Arial" panose="020B0604020202020204" pitchFamily="34" charset="0"/>
-                <a:cs typeface="Arial" panose="020B0604020202020204" pitchFamily="34" charset="0"/>
-              </a:rPr>
-              <a:t>Did we make money?</a:t>
-            </a:r>
-          </a:p>
-          <a:p>
-            <a:pPr marL="285750" indent="-285750">
-              <a:buFont typeface="Arial" panose="020B0604020202020204" pitchFamily="34" charset="0"/>
-              <a:buChar char="•"/>
-            </a:pPr>
-            <a:endParaRPr lang="en-US" sz="2400" dirty="0">
-              <a:solidFill>
-                <a:schemeClr val="bg1">
-                  <a:lumMod val="75000"/>
-                </a:schemeClr>
-              </a:solidFill>
-              <a:latin typeface="Arial" panose="020B0604020202020204" pitchFamily="34" charset="0"/>
-              <a:cs typeface="Arial" panose="020B0604020202020204" pitchFamily="34" charset="0"/>
-            </a:endParaRPr>
-          </a:p>
-          <a:p>
-            <a:pPr marL="285750" indent="-285750">
-              <a:buFont typeface="Arial" panose="020B0604020202020204" pitchFamily="34" charset="0"/>
-              <a:buChar char="•"/>
-            </a:pPr>
-            <a:endParaRPr lang="en-US" sz="2400" dirty="0">
-              <a:solidFill>
-                <a:schemeClr val="bg1">
-                  <a:lumMod val="75000"/>
-                </a:schemeClr>
-              </a:solidFill>
-              <a:latin typeface="Arial" panose="020B0604020202020204" pitchFamily="34" charset="0"/>
-              <a:cs typeface="Arial" panose="020B0604020202020204" pitchFamily="34" charset="0"/>
-            </a:endParaRPr>
-          </a:p>
-          <a:p>
-            <a:pPr marL="285750" indent="-285750">
-              <a:buFont typeface="Arial" panose="020B0604020202020204" pitchFamily="34" charset="0"/>
-              <a:buChar char="•"/>
-            </a:pPr>
-            <a:r>
-              <a:rPr lang="en-US" sz="2400" dirty="0">
-                <a:solidFill>
-                  <a:schemeClr val="bg1">
-                    <a:lumMod val="75000"/>
-                  </a:schemeClr>
-                </a:solidFill>
-                <a:latin typeface="Arial" panose="020B0604020202020204" pitchFamily="34" charset="0"/>
-                <a:cs typeface="Arial" panose="020B0604020202020204" pitchFamily="34" charset="0"/>
-              </a:rPr>
-              <a:t>Why did we make money or lose money?</a:t>
-            </a:r>
-          </a:p>
-          <a:p>
-            <a:endParaRPr lang="en-US" sz="1100" dirty="0">
-              <a:solidFill>
-                <a:schemeClr val="bg1">
-                  <a:lumMod val="85000"/>
-                </a:schemeClr>
-              </a:solidFill>
-              <a:latin typeface="Arial" panose="020B0604020202020204" pitchFamily="34" charset="0"/>
-              <a:cs typeface="Arial" panose="020B0604020202020204" pitchFamily="34" charset="0"/>
-            </a:endParaRPr>
-          </a:p>
-        </p:txBody>
-      </p:sp>
+              <a:t>In this last graph you can see a better picture of when we buy and sell.  For example, we started with buying at the open, then the MACD passes the signal line we sell until it passes it again. At approximately 1:45 the signal line is indicating a upwards trend where we buy until it crosses again to indicate that we sell. </a:t>
+            </a:r>
+          </a:p>
+        </p:txBody>
+      </p:sp>
+      <p:pic>
+        <p:nvPicPr>
+          <p:cNvPr id="14" name="Picture 13">
+            <a:extLst>
+              <a:ext uri="{FF2B5EF4-FFF2-40B4-BE49-F238E27FC236}">
+                <a16:creationId xmlns:a16="http://schemas.microsoft.com/office/drawing/2014/main" id="{91BFAFC5-6049-8A56-A7C9-67686C0F4FDD}"/>
+              </a:ext>
+            </a:extLst>
+          </p:cNvPr>
+          <p:cNvPicPr>
+            <a:picLocks noChangeAspect="1"/>
+          </p:cNvPicPr>
+          <p:nvPr/>
+        </p:nvPicPr>
+        <p:blipFill>
+          <a:blip r:embed="rId2"/>
+          <a:stretch>
+            <a:fillRect/>
+          </a:stretch>
+        </p:blipFill>
+        <p:spPr>
+          <a:xfrm>
+            <a:off x="1984370" y="2381732"/>
+            <a:ext cx="8218495" cy="4189884"/>
+          </a:xfrm>
+          <a:prstGeom prst="rect">
+            <a:avLst/>
+          </a:prstGeom>
+        </p:spPr>
+      </p:pic>
     </p:spTree>
     <p:extLst>
       <p:ext uri="{BB962C8B-B14F-4D97-AF65-F5344CB8AC3E}">
-        <p14:creationId xmlns:p14="http://schemas.microsoft.com/office/powerpoint/2010/main" val="817477383"/>
+        <p14:creationId xmlns:p14="http://schemas.microsoft.com/office/powerpoint/2010/main" val="2179045673"/>
       </p:ext>
     </p:extLst>
   </p:cSld>

</xml_diff>